<commit_message>
Changes in code; project_ppt
</commit_message>
<xml_diff>
--- a/Documents/Study/Project_Presentation.pptx
+++ b/Documents/Study/Project_Presentation.pptx
@@ -7,10 +7,11 @@
   <p:sldIdLst>
     <p:sldId id="256" r:id="rId2"/>
     <p:sldId id="257" r:id="rId3"/>
-    <p:sldId id="258" r:id="rId4"/>
-    <p:sldId id="259" r:id="rId5"/>
-    <p:sldId id="260" r:id="rId6"/>
-    <p:sldId id="261" r:id="rId7"/>
+    <p:sldId id="262" r:id="rId4"/>
+    <p:sldId id="258" r:id="rId5"/>
+    <p:sldId id="259" r:id="rId6"/>
+    <p:sldId id="260" r:id="rId7"/>
+    <p:sldId id="261" r:id="rId8"/>
   </p:sldIdLst>
   <p:sldSz cx="12192000" cy="6858000"/>
   <p:notesSz cx="6858000" cy="9144000"/>
@@ -248,7 +249,7 @@
           <a:p>
             <a:fld id="{75507C98-8ED6-4F4D-BBFA-74E792F1F6FB}" type="datetimeFigureOut">
               <a:rPr lang="en-US" smtClean="0"/>
-              <a:t>5/17/2022</a:t>
+              <a:t>5/22/2022</a:t>
             </a:fld>
             <a:endParaRPr lang="en-US"/>
           </a:p>
@@ -418,7 +419,7 @@
           <a:p>
             <a:fld id="{75507C98-8ED6-4F4D-BBFA-74E792F1F6FB}" type="datetimeFigureOut">
               <a:rPr lang="en-US" smtClean="0"/>
-              <a:t>5/17/2022</a:t>
+              <a:t>5/22/2022</a:t>
             </a:fld>
             <a:endParaRPr lang="en-US"/>
           </a:p>
@@ -598,7 +599,7 @@
           <a:p>
             <a:fld id="{75507C98-8ED6-4F4D-BBFA-74E792F1F6FB}" type="datetimeFigureOut">
               <a:rPr lang="en-US" smtClean="0"/>
-              <a:t>5/17/2022</a:t>
+              <a:t>5/22/2022</a:t>
             </a:fld>
             <a:endParaRPr lang="en-US"/>
           </a:p>
@@ -768,7 +769,7 @@
           <a:p>
             <a:fld id="{75507C98-8ED6-4F4D-BBFA-74E792F1F6FB}" type="datetimeFigureOut">
               <a:rPr lang="en-US" smtClean="0"/>
-              <a:t>5/17/2022</a:t>
+              <a:t>5/22/2022</a:t>
             </a:fld>
             <a:endParaRPr lang="en-US"/>
           </a:p>
@@ -1014,7 +1015,7 @@
           <a:p>
             <a:fld id="{75507C98-8ED6-4F4D-BBFA-74E792F1F6FB}" type="datetimeFigureOut">
               <a:rPr lang="en-US" smtClean="0"/>
-              <a:t>5/17/2022</a:t>
+              <a:t>5/22/2022</a:t>
             </a:fld>
             <a:endParaRPr lang="en-US"/>
           </a:p>
@@ -1246,7 +1247,7 @@
           <a:p>
             <a:fld id="{75507C98-8ED6-4F4D-BBFA-74E792F1F6FB}" type="datetimeFigureOut">
               <a:rPr lang="en-US" smtClean="0"/>
-              <a:t>5/17/2022</a:t>
+              <a:t>5/22/2022</a:t>
             </a:fld>
             <a:endParaRPr lang="en-US"/>
           </a:p>
@@ -1613,7 +1614,7 @@
           <a:p>
             <a:fld id="{75507C98-8ED6-4F4D-BBFA-74E792F1F6FB}" type="datetimeFigureOut">
               <a:rPr lang="en-US" smtClean="0"/>
-              <a:t>5/17/2022</a:t>
+              <a:t>5/22/2022</a:t>
             </a:fld>
             <a:endParaRPr lang="en-US"/>
           </a:p>
@@ -1731,7 +1732,7 @@
           <a:p>
             <a:fld id="{75507C98-8ED6-4F4D-BBFA-74E792F1F6FB}" type="datetimeFigureOut">
               <a:rPr lang="en-US" smtClean="0"/>
-              <a:t>5/17/2022</a:t>
+              <a:t>5/22/2022</a:t>
             </a:fld>
             <a:endParaRPr lang="en-US"/>
           </a:p>
@@ -1826,7 +1827,7 @@
           <a:p>
             <a:fld id="{75507C98-8ED6-4F4D-BBFA-74E792F1F6FB}" type="datetimeFigureOut">
               <a:rPr lang="en-US" smtClean="0"/>
-              <a:t>5/17/2022</a:t>
+              <a:t>5/22/2022</a:t>
             </a:fld>
             <a:endParaRPr lang="en-US"/>
           </a:p>
@@ -2103,7 +2104,7 @@
           <a:p>
             <a:fld id="{75507C98-8ED6-4F4D-BBFA-74E792F1F6FB}" type="datetimeFigureOut">
               <a:rPr lang="en-US" smtClean="0"/>
-              <a:t>5/17/2022</a:t>
+              <a:t>5/22/2022</a:t>
             </a:fld>
             <a:endParaRPr lang="en-US"/>
           </a:p>
@@ -2356,7 +2357,7 @@
           <a:p>
             <a:fld id="{75507C98-8ED6-4F4D-BBFA-74E792F1F6FB}" type="datetimeFigureOut">
               <a:rPr lang="en-US" smtClean="0"/>
-              <a:t>5/17/2022</a:t>
+              <a:t>5/22/2022</a:t>
             </a:fld>
             <a:endParaRPr lang="en-US"/>
           </a:p>
@@ -2569,7 +2570,7 @@
           <a:p>
             <a:fld id="{75507C98-8ED6-4F4D-BBFA-74E792F1F6FB}" type="datetimeFigureOut">
               <a:rPr lang="en-US" smtClean="0"/>
-              <a:t>5/17/2022</a:t>
+              <a:t>5/22/2022</a:t>
             </a:fld>
             <a:endParaRPr lang="en-US"/>
           </a:p>
@@ -2996,15 +2997,7 @@
           <a:p>
             <a:r>
               <a:rPr lang="en-US" dirty="0" smtClean="0"/>
-              <a:t>Text </a:t>
-            </a:r>
-            <a:r>
-              <a:rPr lang="en-US" dirty="0" smtClean="0"/>
-              <a:t>Recognition in </a:t>
-            </a:r>
-            <a:r>
-              <a:rPr lang="en-US" dirty="0" smtClean="0"/>
-              <a:t>Natural Scenes</a:t>
+              <a:t>Text Recognition in Natural Scenes</a:t>
             </a:r>
             <a:endParaRPr lang="en-US" dirty="0"/>
           </a:p>
@@ -3015,7 +3008,7 @@
           <p:cNvPr id="4" name="Picture 3">
             <a:extLst>
               <a:ext uri="{FF2B5EF4-FFF2-40B4-BE49-F238E27FC236}">
-                <a16:creationId xmlns="" xmlns:a16="http://schemas.microsoft.com/office/drawing/2014/main" id="{4F123114-E0DF-4542-9867-FE12447B6DCE}"/>
+                <a16:creationId xmlns:a16="http://schemas.microsoft.com/office/drawing/2014/main" xmlns="" id="{4F123114-E0DF-4542-9867-FE12447B6DCE}"/>
               </a:ext>
             </a:extLst>
           </p:cNvPr>
@@ -3184,7 +3177,7 @@
           <p:cNvPr id="5" name="Picture 4">
             <a:extLst>
               <a:ext uri="{FF2B5EF4-FFF2-40B4-BE49-F238E27FC236}">
-                <a16:creationId xmlns="" xmlns:a16="http://schemas.microsoft.com/office/drawing/2014/main" id="{4F123114-E0DF-4542-9867-FE12447B6DCE}"/>
+                <a16:creationId xmlns:a16="http://schemas.microsoft.com/office/drawing/2014/main" xmlns="" id="{4F123114-E0DF-4542-9867-FE12447B6DCE}"/>
               </a:ext>
             </a:extLst>
           </p:cNvPr>
@@ -3254,7 +3247,7 @@
         <p:spPr>
           <a:xfrm>
             <a:off x="685800" y="512064"/>
-            <a:ext cx="8366760" cy="4370427"/>
+            <a:ext cx="7680960" cy="400110"/>
           </a:xfrm>
           <a:prstGeom prst="rect">
             <a:avLst/>
@@ -3269,118 +3262,13 @@
           <a:p>
             <a:r>
               <a:rPr lang="en-US" sz="2000" b="1" dirty="0" smtClean="0"/>
-              <a:t>Existing approaches comparison:</a:t>
-            </a:r>
-          </a:p>
-          <a:p>
-            <a:endParaRPr lang="en-US" sz="2000" dirty="0" smtClean="0"/>
-          </a:p>
-          <a:p>
-            <a:r>
-              <a:rPr lang="en-US" sz="2000" dirty="0" smtClean="0"/>
-              <a:t>Non Deep Learning methods:</a:t>
-            </a:r>
-          </a:p>
-          <a:p>
-            <a:pPr marL="342900" indent="-342900">
-              <a:buFont typeface="Arial" panose="020B0604020202020204" pitchFamily="34" charset="0"/>
-              <a:buChar char="•"/>
-            </a:pPr>
-            <a:r>
-              <a:rPr lang="en-US" sz="2000" dirty="0" smtClean="0"/>
-              <a:t>MRF (Markov Random Field)</a:t>
-            </a:r>
-          </a:p>
-          <a:p>
-            <a:pPr marL="342900" indent="-342900">
-              <a:buFont typeface="Arial" panose="020B0604020202020204" pitchFamily="34" charset="0"/>
-              <a:buChar char="•"/>
-            </a:pPr>
-            <a:r>
-              <a:rPr lang="en-US" sz="2000" dirty="0" smtClean="0"/>
-              <a:t>NESP (Nonlinear Enhancement and Selection of Plane</a:t>
-            </a:r>
-          </a:p>
-          <a:p>
-            <a:pPr marL="342900" indent="-342900">
-              <a:buFont typeface="Arial" panose="020B0604020202020204" pitchFamily="34" charset="0"/>
-              <a:buChar char="•"/>
-            </a:pPr>
-            <a:r>
-              <a:rPr lang="en-US" sz="2000" dirty="0" smtClean="0"/>
-              <a:t>HOG + CRF (Histogram of Oriented Gradients + Conditional Random Field)</a:t>
-            </a:r>
-          </a:p>
-          <a:p>
-            <a:pPr marL="342900" indent="-342900">
-              <a:buFont typeface="Arial" panose="020B0604020202020204" pitchFamily="34" charset="0"/>
-              <a:buChar char="•"/>
-            </a:pPr>
-            <a:r>
-              <a:rPr lang="en-US" sz="2000" dirty="0" smtClean="0"/>
-              <a:t>WFST (Weighted Finite-State Transducer)</a:t>
-            </a:r>
-          </a:p>
-          <a:p>
-            <a:pPr marL="342900" indent="-342900">
-              <a:buFont typeface="Arial" panose="020B0604020202020204" pitchFamily="34" charset="0"/>
-              <a:buChar char="•"/>
-            </a:pPr>
-            <a:endParaRPr lang="en-US" sz="2000" dirty="0"/>
-          </a:p>
-          <a:p>
-            <a:r>
-              <a:rPr lang="en-US" sz="2000" dirty="0" smtClean="0"/>
-              <a:t>Deep Learning methods:</a:t>
-            </a:r>
-          </a:p>
-          <a:p>
-            <a:pPr marL="342900" indent="-342900">
-              <a:buFont typeface="Arial" panose="020B0604020202020204" pitchFamily="34" charset="0"/>
-              <a:buChar char="•"/>
-            </a:pPr>
-            <a:r>
-              <a:rPr lang="en-US" sz="2000" dirty="0" smtClean="0"/>
-              <a:t>CNN (Convolutional Neural Network)</a:t>
-            </a:r>
-          </a:p>
-          <a:p>
-            <a:pPr marL="342900" indent="-342900">
-              <a:buFont typeface="Arial" panose="020B0604020202020204" pitchFamily="34" charset="0"/>
-              <a:buChar char="•"/>
-            </a:pPr>
-            <a:r>
-              <a:rPr lang="en-US" sz="2000" dirty="0" smtClean="0"/>
-              <a:t>RNN (Recurrent Neural Network)</a:t>
-            </a:r>
-          </a:p>
-          <a:p>
-            <a:pPr marL="342900" indent="-342900">
-              <a:buFont typeface="Arial" panose="020B0604020202020204" pitchFamily="34" charset="0"/>
-              <a:buChar char="•"/>
-            </a:pPr>
-            <a:r>
-              <a:rPr lang="en-US" sz="2000" dirty="0" smtClean="0"/>
-              <a:t>RCNN (Recurrent CNN) with backbone (resnet101, resnet50)</a:t>
-            </a:r>
-          </a:p>
-          <a:p>
-            <a:pPr marL="342900" indent="-342900">
-              <a:buFont typeface="Arial" panose="020B0604020202020204" pitchFamily="34" charset="0"/>
-              <a:buChar char="•"/>
-            </a:pPr>
-            <a:r>
-              <a:rPr lang="en-US" sz="2000" dirty="0" smtClean="0"/>
-              <a:t>Mask-RCNN with backbone (resnet101, resnet50)</a:t>
-            </a:r>
-            <a:endParaRPr lang="en-US" sz="2000" dirty="0"/>
-          </a:p>
-          <a:p>
-            <a:pPr marL="285750" indent="-285750">
-              <a:buFont typeface="Arial" panose="020B0604020202020204" pitchFamily="34" charset="0"/>
-              <a:buChar char="•"/>
-            </a:pPr>
-            <a:endParaRPr lang="en-US" dirty="0" smtClean="0"/>
+              <a:t>Block Diagram</a:t>
+            </a:r>
+            <a:r>
+              <a:rPr lang="en-US" sz="2000" b="1" dirty="0" smtClean="0"/>
+              <a:t>:</a:t>
+            </a:r>
+            <a:endParaRPr lang="en-US" sz="2000" b="1" dirty="0" smtClean="0"/>
           </a:p>
         </p:txBody>
       </p:sp>
@@ -3389,7 +3277,7 @@
           <p:cNvPr id="5" name="Picture 4">
             <a:extLst>
               <a:ext uri="{FF2B5EF4-FFF2-40B4-BE49-F238E27FC236}">
-                <a16:creationId xmlns="" xmlns:a16="http://schemas.microsoft.com/office/drawing/2014/main" id="{4F123114-E0DF-4542-9867-FE12447B6DCE}"/>
+                <a16:creationId xmlns:a16="http://schemas.microsoft.com/office/drawing/2014/main" xmlns="" id="{4F123114-E0DF-4542-9867-FE12447B6DCE}"/>
               </a:ext>
             </a:extLst>
           </p:cNvPr>
@@ -3420,6 +3308,1310 @@
           </a:prstGeom>
         </p:spPr>
       </p:pic>
+      <p:sp>
+        <p:nvSpPr>
+          <p:cNvPr id="2" name="Rectangle 1"/>
+          <p:cNvSpPr/>
+          <p:nvPr/>
+        </p:nvSpPr>
+        <p:spPr>
+          <a:xfrm>
+            <a:off x="320040" y="2191512"/>
+            <a:ext cx="1536192" cy="804672"/>
+          </a:xfrm>
+          <a:prstGeom prst="rect">
+            <a:avLst/>
+          </a:prstGeom>
+          <a:noFill/>
+        </p:spPr>
+        <p:style>
+          <a:lnRef idx="2">
+            <a:schemeClr val="accent1">
+              <a:shade val="50000"/>
+            </a:schemeClr>
+          </a:lnRef>
+          <a:fillRef idx="1">
+            <a:schemeClr val="accent1"/>
+          </a:fillRef>
+          <a:effectRef idx="0">
+            <a:schemeClr val="accent1"/>
+          </a:effectRef>
+          <a:fontRef idx="minor">
+            <a:schemeClr val="lt1"/>
+          </a:fontRef>
+        </p:style>
+        <p:txBody>
+          <a:bodyPr rtlCol="0" anchor="ctr"/>
+          <a:lstStyle/>
+          <a:p>
+            <a:pPr algn="ctr"/>
+            <a:r>
+              <a:rPr lang="en-US" sz="1600" dirty="0" smtClean="0">
+                <a:solidFill>
+                  <a:schemeClr val="tx1"/>
+                </a:solidFill>
+              </a:rPr>
+              <a:t>Dataset collection</a:t>
+            </a:r>
+            <a:endParaRPr lang="en-US" sz="1600" dirty="0">
+              <a:solidFill>
+                <a:schemeClr val="tx1"/>
+              </a:solidFill>
+            </a:endParaRPr>
+          </a:p>
+        </p:txBody>
+      </p:sp>
+      <p:sp>
+        <p:nvSpPr>
+          <p:cNvPr id="6" name="Rectangle 5"/>
+          <p:cNvSpPr/>
+          <p:nvPr/>
+        </p:nvSpPr>
+        <p:spPr>
+          <a:xfrm>
+            <a:off x="4472715" y="2191512"/>
+            <a:ext cx="1536192" cy="804672"/>
+          </a:xfrm>
+          <a:prstGeom prst="rect">
+            <a:avLst/>
+          </a:prstGeom>
+          <a:noFill/>
+        </p:spPr>
+        <p:style>
+          <a:lnRef idx="2">
+            <a:schemeClr val="accent1">
+              <a:shade val="50000"/>
+            </a:schemeClr>
+          </a:lnRef>
+          <a:fillRef idx="1">
+            <a:schemeClr val="accent1"/>
+          </a:fillRef>
+          <a:effectRef idx="0">
+            <a:schemeClr val="accent1"/>
+          </a:effectRef>
+          <a:fontRef idx="minor">
+            <a:schemeClr val="lt1"/>
+          </a:fontRef>
+        </p:style>
+        <p:txBody>
+          <a:bodyPr rtlCol="0" anchor="ctr"/>
+          <a:lstStyle/>
+          <a:p>
+            <a:pPr algn="ctr"/>
+            <a:r>
+              <a:rPr lang="en-US" sz="1600" dirty="0" smtClean="0">
+                <a:solidFill>
+                  <a:schemeClr val="tx1"/>
+                </a:solidFill>
+              </a:rPr>
+              <a:t>Feature Extraction</a:t>
+            </a:r>
+            <a:endParaRPr lang="en-US" sz="1600" dirty="0">
+              <a:solidFill>
+                <a:schemeClr val="tx1"/>
+              </a:solidFill>
+            </a:endParaRPr>
+          </a:p>
+        </p:txBody>
+      </p:sp>
+      <p:sp>
+        <p:nvSpPr>
+          <p:cNvPr id="7" name="Rectangle 6"/>
+          <p:cNvSpPr/>
+          <p:nvPr/>
+        </p:nvSpPr>
+        <p:spPr>
+          <a:xfrm>
+            <a:off x="2360515" y="2191512"/>
+            <a:ext cx="1536192" cy="804672"/>
+          </a:xfrm>
+          <a:prstGeom prst="rect">
+            <a:avLst/>
+          </a:prstGeom>
+          <a:noFill/>
+        </p:spPr>
+        <p:style>
+          <a:lnRef idx="2">
+            <a:schemeClr val="accent1">
+              <a:shade val="50000"/>
+            </a:schemeClr>
+          </a:lnRef>
+          <a:fillRef idx="1">
+            <a:schemeClr val="accent1"/>
+          </a:fillRef>
+          <a:effectRef idx="0">
+            <a:schemeClr val="accent1"/>
+          </a:effectRef>
+          <a:fontRef idx="minor">
+            <a:schemeClr val="lt1"/>
+          </a:fontRef>
+        </p:style>
+        <p:txBody>
+          <a:bodyPr rtlCol="0" anchor="ctr"/>
+          <a:lstStyle/>
+          <a:p>
+            <a:pPr algn="ctr"/>
+            <a:r>
+              <a:rPr lang="en-US" sz="1600" dirty="0" smtClean="0">
+                <a:solidFill>
+                  <a:schemeClr val="tx1"/>
+                </a:solidFill>
+              </a:rPr>
+              <a:t>Preprocessing image sets</a:t>
+            </a:r>
+            <a:endParaRPr lang="en-US" sz="1600" dirty="0">
+              <a:solidFill>
+                <a:schemeClr val="tx1"/>
+              </a:solidFill>
+            </a:endParaRPr>
+          </a:p>
+        </p:txBody>
+      </p:sp>
+      <p:cxnSp>
+        <p:nvCxnSpPr>
+          <p:cNvPr id="8" name="Straight Arrow Connector 7"/>
+          <p:cNvCxnSpPr>
+            <a:stCxn id="7" idx="3"/>
+            <a:endCxn id="6" idx="1"/>
+          </p:cNvCxnSpPr>
+          <p:nvPr/>
+        </p:nvCxnSpPr>
+        <p:spPr>
+          <a:xfrm>
+            <a:off x="3896707" y="2593848"/>
+            <a:ext cx="576008" cy="0"/>
+          </a:xfrm>
+          <a:prstGeom prst="straightConnector1">
+            <a:avLst/>
+          </a:prstGeom>
+          <a:ln>
+            <a:tailEnd type="triangle"/>
+          </a:ln>
+        </p:spPr>
+        <p:style>
+          <a:lnRef idx="1">
+            <a:schemeClr val="accent1"/>
+          </a:lnRef>
+          <a:fillRef idx="0">
+            <a:schemeClr val="accent1"/>
+          </a:fillRef>
+          <a:effectRef idx="0">
+            <a:schemeClr val="accent1"/>
+          </a:effectRef>
+          <a:fontRef idx="minor">
+            <a:schemeClr val="tx1"/>
+          </a:fontRef>
+        </p:style>
+      </p:cxnSp>
+      <p:cxnSp>
+        <p:nvCxnSpPr>
+          <p:cNvPr id="10" name="Straight Arrow Connector 9"/>
+          <p:cNvCxnSpPr>
+            <a:stCxn id="2" idx="3"/>
+            <a:endCxn id="7" idx="1"/>
+          </p:cNvCxnSpPr>
+          <p:nvPr/>
+        </p:nvCxnSpPr>
+        <p:spPr>
+          <a:xfrm>
+            <a:off x="1856232" y="2593848"/>
+            <a:ext cx="504283" cy="0"/>
+          </a:xfrm>
+          <a:prstGeom prst="straightConnector1">
+            <a:avLst/>
+          </a:prstGeom>
+          <a:ln>
+            <a:tailEnd type="triangle"/>
+          </a:ln>
+        </p:spPr>
+        <p:style>
+          <a:lnRef idx="1">
+            <a:schemeClr val="accent1"/>
+          </a:lnRef>
+          <a:fillRef idx="0">
+            <a:schemeClr val="accent1"/>
+          </a:fillRef>
+          <a:effectRef idx="0">
+            <a:schemeClr val="accent1"/>
+          </a:effectRef>
+          <a:fontRef idx="minor">
+            <a:schemeClr val="tx1"/>
+          </a:fontRef>
+        </p:style>
+      </p:cxnSp>
+      <p:sp>
+        <p:nvSpPr>
+          <p:cNvPr id="17" name="TextBox 16"/>
+          <p:cNvSpPr txBox="1"/>
+          <p:nvPr/>
+        </p:nvSpPr>
+        <p:spPr>
+          <a:xfrm>
+            <a:off x="4400990" y="2996184"/>
+            <a:ext cx="2374811" cy="584775"/>
+          </a:xfrm>
+          <a:prstGeom prst="rect">
+            <a:avLst/>
+          </a:prstGeom>
+          <a:noFill/>
+        </p:spPr>
+        <p:txBody>
+          <a:bodyPr wrap="square" rtlCol="0">
+            <a:spAutoFit/>
+          </a:bodyPr>
+          <a:lstStyle/>
+          <a:p>
+            <a:r>
+              <a:rPr lang="en-US" sz="1600" i="1" dirty="0" smtClean="0"/>
+              <a:t>(using </a:t>
+            </a:r>
+          </a:p>
+          <a:p>
+            <a:r>
+              <a:rPr lang="en-US" sz="1600" i="1" dirty="0" smtClean="0"/>
+              <a:t>Resnet-50 architecture)</a:t>
+            </a:r>
+            <a:endParaRPr lang="en-US" sz="1600" i="1" dirty="0"/>
+          </a:p>
+        </p:txBody>
+      </p:sp>
+      <p:grpSp>
+        <p:nvGrpSpPr>
+          <p:cNvPr id="24" name="Group 23"/>
+          <p:cNvGrpSpPr/>
+          <p:nvPr/>
+        </p:nvGrpSpPr>
+        <p:grpSpPr>
+          <a:xfrm>
+            <a:off x="3179528" y="1648516"/>
+            <a:ext cx="1998560" cy="948380"/>
+            <a:chOff x="3545288" y="1648516"/>
+            <a:chExt cx="1998560" cy="948380"/>
+          </a:xfrm>
+        </p:grpSpPr>
+        <p:sp>
+          <p:nvSpPr>
+            <p:cNvPr id="9" name="TextBox 8"/>
+            <p:cNvSpPr txBox="1"/>
+            <p:nvPr/>
+          </p:nvSpPr>
+          <p:spPr>
+            <a:xfrm>
+              <a:off x="3545288" y="1648516"/>
+              <a:ext cx="1998560" cy="338554"/>
+            </a:xfrm>
+            <a:prstGeom prst="rect">
+              <a:avLst/>
+            </a:prstGeom>
+            <a:noFill/>
+          </p:spPr>
+          <p:txBody>
+            <a:bodyPr wrap="none" rtlCol="0">
+              <a:spAutoFit/>
+            </a:bodyPr>
+            <a:lstStyle/>
+            <a:p>
+              <a:r>
+                <a:rPr lang="en-US" sz="1600" i="1" dirty="0" smtClean="0"/>
+                <a:t>Batch of input images</a:t>
+              </a:r>
+              <a:endParaRPr lang="en-US" sz="1600" i="1" dirty="0"/>
+            </a:p>
+          </p:txBody>
+        </p:sp>
+        <p:cxnSp>
+          <p:nvCxnSpPr>
+            <p:cNvPr id="20" name="Straight Arrow Connector 19"/>
+            <p:cNvCxnSpPr/>
+            <p:nvPr/>
+          </p:nvCxnSpPr>
+          <p:spPr>
+            <a:xfrm flipV="1">
+              <a:off x="4544568" y="1995733"/>
+              <a:ext cx="5903" cy="601163"/>
+            </a:xfrm>
+            <a:prstGeom prst="straightConnector1">
+              <a:avLst/>
+            </a:prstGeom>
+            <a:ln>
+              <a:solidFill>
+                <a:schemeClr val="tx1"/>
+              </a:solidFill>
+              <a:prstDash val="dash"/>
+              <a:tailEnd type="triangle"/>
+            </a:ln>
+          </p:spPr>
+          <p:style>
+            <a:lnRef idx="1">
+              <a:schemeClr val="accent1"/>
+            </a:lnRef>
+            <a:fillRef idx="0">
+              <a:schemeClr val="accent1"/>
+            </a:fillRef>
+            <a:effectRef idx="0">
+              <a:schemeClr val="accent1"/>
+            </a:effectRef>
+            <a:fontRef idx="minor">
+              <a:schemeClr val="tx1"/>
+            </a:fontRef>
+          </p:style>
+        </p:cxnSp>
+      </p:grpSp>
+      <p:sp>
+        <p:nvSpPr>
+          <p:cNvPr id="25" name="Rectangle 24"/>
+          <p:cNvSpPr/>
+          <p:nvPr/>
+        </p:nvSpPr>
+        <p:spPr>
+          <a:xfrm>
+            <a:off x="6584914" y="2191512"/>
+            <a:ext cx="1850141" cy="804672"/>
+          </a:xfrm>
+          <a:prstGeom prst="rect">
+            <a:avLst/>
+          </a:prstGeom>
+          <a:noFill/>
+        </p:spPr>
+        <p:style>
+          <a:lnRef idx="2">
+            <a:schemeClr val="accent1">
+              <a:shade val="50000"/>
+            </a:schemeClr>
+          </a:lnRef>
+          <a:fillRef idx="1">
+            <a:schemeClr val="accent1"/>
+          </a:fillRef>
+          <a:effectRef idx="0">
+            <a:schemeClr val="accent1"/>
+          </a:effectRef>
+          <a:fontRef idx="minor">
+            <a:schemeClr val="lt1"/>
+          </a:fontRef>
+        </p:style>
+        <p:txBody>
+          <a:bodyPr rtlCol="0" anchor="ctr"/>
+          <a:lstStyle/>
+          <a:p>
+            <a:pPr algn="ctr"/>
+            <a:r>
+              <a:rPr lang="en-US" sz="1600" dirty="0" smtClean="0">
+                <a:solidFill>
+                  <a:schemeClr val="tx1"/>
+                </a:solidFill>
+              </a:rPr>
+              <a:t>Classifier/Detection Model</a:t>
+            </a:r>
+            <a:endParaRPr lang="en-US" sz="1600" dirty="0">
+              <a:solidFill>
+                <a:schemeClr val="tx1"/>
+              </a:solidFill>
+            </a:endParaRPr>
+          </a:p>
+        </p:txBody>
+      </p:sp>
+      <p:cxnSp>
+        <p:nvCxnSpPr>
+          <p:cNvPr id="26" name="Straight Arrow Connector 25"/>
+          <p:cNvCxnSpPr>
+            <a:stCxn id="6" idx="3"/>
+            <a:endCxn id="25" idx="1"/>
+          </p:cNvCxnSpPr>
+          <p:nvPr/>
+        </p:nvCxnSpPr>
+        <p:spPr>
+          <a:xfrm>
+            <a:off x="6008907" y="2593848"/>
+            <a:ext cx="576007" cy="0"/>
+          </a:xfrm>
+          <a:prstGeom prst="straightConnector1">
+            <a:avLst/>
+          </a:prstGeom>
+          <a:ln>
+            <a:tailEnd type="triangle"/>
+          </a:ln>
+        </p:spPr>
+        <p:style>
+          <a:lnRef idx="1">
+            <a:schemeClr val="accent1"/>
+          </a:lnRef>
+          <a:fillRef idx="0">
+            <a:schemeClr val="accent1"/>
+          </a:fillRef>
+          <a:effectRef idx="0">
+            <a:schemeClr val="accent1"/>
+          </a:effectRef>
+          <a:fontRef idx="minor">
+            <a:schemeClr val="tx1"/>
+          </a:fontRef>
+        </p:style>
+      </p:cxnSp>
+      <p:grpSp>
+        <p:nvGrpSpPr>
+          <p:cNvPr id="71" name="Group 70"/>
+          <p:cNvGrpSpPr/>
+          <p:nvPr/>
+        </p:nvGrpSpPr>
+        <p:grpSpPr>
+          <a:xfrm>
+            <a:off x="8435055" y="1974944"/>
+            <a:ext cx="975707" cy="1304483"/>
+            <a:chOff x="8435055" y="1974944"/>
+            <a:chExt cx="975707" cy="1304483"/>
+          </a:xfrm>
+        </p:grpSpPr>
+        <p:grpSp>
+          <p:nvGrpSpPr>
+            <p:cNvPr id="43" name="Group 42"/>
+            <p:cNvGrpSpPr/>
+            <p:nvPr/>
+          </p:nvGrpSpPr>
+          <p:grpSpPr>
+            <a:xfrm>
+              <a:off x="8961119" y="1974944"/>
+              <a:ext cx="449643" cy="1304483"/>
+              <a:chOff x="8961119" y="1874360"/>
+              <a:chExt cx="449643" cy="1304483"/>
+            </a:xfrm>
+          </p:grpSpPr>
+          <p:cxnSp>
+            <p:nvCxnSpPr>
+              <p:cNvPr id="33" name="Straight Arrow Connector 32"/>
+              <p:cNvCxnSpPr>
+                <a:endCxn id="31" idx="1"/>
+              </p:cNvCxnSpPr>
+              <p:nvPr/>
+            </p:nvCxnSpPr>
+            <p:spPr>
+              <a:xfrm>
+                <a:off x="8961535" y="1874360"/>
+                <a:ext cx="449227" cy="0"/>
+              </a:xfrm>
+              <a:prstGeom prst="straightConnector1">
+                <a:avLst/>
+              </a:prstGeom>
+              <a:ln>
+                <a:tailEnd type="triangle"/>
+              </a:ln>
+            </p:spPr>
+            <p:style>
+              <a:lnRef idx="1">
+                <a:schemeClr val="accent1"/>
+              </a:lnRef>
+              <a:fillRef idx="0">
+                <a:schemeClr val="accent1"/>
+              </a:fillRef>
+              <a:effectRef idx="0">
+                <a:schemeClr val="accent1"/>
+              </a:effectRef>
+              <a:fontRef idx="minor">
+                <a:schemeClr val="tx1"/>
+              </a:fontRef>
+            </p:style>
+          </p:cxnSp>
+          <p:cxnSp>
+            <p:nvCxnSpPr>
+              <p:cNvPr id="39" name="Straight Arrow Connector 38"/>
+              <p:cNvCxnSpPr>
+                <a:endCxn id="32" idx="1"/>
+              </p:cNvCxnSpPr>
+              <p:nvPr/>
+            </p:nvCxnSpPr>
+            <p:spPr>
+              <a:xfrm>
+                <a:off x="8961534" y="3175635"/>
+                <a:ext cx="449228" cy="0"/>
+              </a:xfrm>
+              <a:prstGeom prst="straightConnector1">
+                <a:avLst/>
+              </a:prstGeom>
+              <a:ln>
+                <a:tailEnd type="triangle"/>
+              </a:ln>
+            </p:spPr>
+            <p:style>
+              <a:lnRef idx="1">
+                <a:schemeClr val="accent1"/>
+              </a:lnRef>
+              <a:fillRef idx="0">
+                <a:schemeClr val="accent1"/>
+              </a:fillRef>
+              <a:effectRef idx="0">
+                <a:schemeClr val="accent1"/>
+              </a:effectRef>
+              <a:fontRef idx="minor">
+                <a:schemeClr val="tx1"/>
+              </a:fontRef>
+            </p:style>
+          </p:cxnSp>
+          <p:cxnSp>
+            <p:nvCxnSpPr>
+              <p:cNvPr id="42" name="Straight Connector 41"/>
+              <p:cNvCxnSpPr/>
+              <p:nvPr/>
+            </p:nvCxnSpPr>
+            <p:spPr>
+              <a:xfrm>
+                <a:off x="8961119" y="1877568"/>
+                <a:ext cx="0" cy="1301275"/>
+              </a:xfrm>
+              <a:prstGeom prst="line">
+                <a:avLst/>
+              </a:prstGeom>
+            </p:spPr>
+            <p:style>
+              <a:lnRef idx="1">
+                <a:schemeClr val="accent1"/>
+              </a:lnRef>
+              <a:fillRef idx="0">
+                <a:schemeClr val="accent1"/>
+              </a:fillRef>
+              <a:effectRef idx="0">
+                <a:schemeClr val="accent1"/>
+              </a:effectRef>
+              <a:fontRef idx="minor">
+                <a:schemeClr val="tx1"/>
+              </a:fontRef>
+            </p:style>
+          </p:cxnSp>
+        </p:grpSp>
+        <p:cxnSp>
+          <p:nvCxnSpPr>
+            <p:cNvPr id="44" name="Straight Connector 43"/>
+            <p:cNvCxnSpPr>
+              <a:endCxn id="25" idx="3"/>
+            </p:cNvCxnSpPr>
+            <p:nvPr/>
+          </p:nvCxnSpPr>
+          <p:spPr>
+            <a:xfrm flipH="1">
+              <a:off x="8435055" y="2593848"/>
+              <a:ext cx="525649" cy="0"/>
+            </a:xfrm>
+            <a:prstGeom prst="line">
+              <a:avLst/>
+            </a:prstGeom>
+          </p:spPr>
+          <p:style>
+            <a:lnRef idx="1">
+              <a:schemeClr val="accent1"/>
+            </a:lnRef>
+            <a:fillRef idx="0">
+              <a:schemeClr val="accent1"/>
+            </a:fillRef>
+            <a:effectRef idx="0">
+              <a:schemeClr val="accent1"/>
+            </a:effectRef>
+            <a:fontRef idx="minor">
+              <a:schemeClr val="tx1"/>
+            </a:fontRef>
+          </p:style>
+        </p:cxnSp>
+      </p:grpSp>
+      <p:sp>
+        <p:nvSpPr>
+          <p:cNvPr id="55" name="TextBox 54"/>
+          <p:cNvSpPr txBox="1"/>
+          <p:nvPr/>
+        </p:nvSpPr>
+        <p:spPr>
+          <a:xfrm>
+            <a:off x="1230399" y="1639145"/>
+            <a:ext cx="1708160" cy="338554"/>
+          </a:xfrm>
+          <a:prstGeom prst="rect">
+            <a:avLst/>
+          </a:prstGeom>
+          <a:noFill/>
+        </p:spPr>
+        <p:txBody>
+          <a:bodyPr wrap="none" rtlCol="0">
+            <a:spAutoFit/>
+          </a:bodyPr>
+          <a:lstStyle/>
+          <a:p>
+            <a:r>
+              <a:rPr lang="en-US" sz="1600" i="1" dirty="0"/>
+              <a:t>Train-Val-Test split</a:t>
+            </a:r>
+          </a:p>
+        </p:txBody>
+      </p:sp>
+      <p:cxnSp>
+        <p:nvCxnSpPr>
+          <p:cNvPr id="56" name="Straight Arrow Connector 55"/>
+          <p:cNvCxnSpPr/>
+          <p:nvPr/>
+        </p:nvCxnSpPr>
+        <p:spPr>
+          <a:xfrm flipV="1">
+            <a:off x="2084479" y="1985192"/>
+            <a:ext cx="5903" cy="601163"/>
+          </a:xfrm>
+          <a:prstGeom prst="straightConnector1">
+            <a:avLst/>
+          </a:prstGeom>
+          <a:ln>
+            <a:solidFill>
+              <a:schemeClr val="tx1"/>
+            </a:solidFill>
+            <a:prstDash val="dash"/>
+            <a:tailEnd type="triangle"/>
+          </a:ln>
+        </p:spPr>
+        <p:style>
+          <a:lnRef idx="1">
+            <a:schemeClr val="accent1"/>
+          </a:lnRef>
+          <a:fillRef idx="0">
+            <a:schemeClr val="accent1"/>
+          </a:fillRef>
+          <a:effectRef idx="0">
+            <a:schemeClr val="accent1"/>
+          </a:effectRef>
+          <a:fontRef idx="minor">
+            <a:schemeClr val="tx1"/>
+          </a:fontRef>
+        </p:style>
+      </p:cxnSp>
+      <p:grpSp>
+        <p:nvGrpSpPr>
+          <p:cNvPr id="65" name="Group 64"/>
+          <p:cNvGrpSpPr/>
+          <p:nvPr/>
+        </p:nvGrpSpPr>
+        <p:grpSpPr>
+          <a:xfrm>
+            <a:off x="9140429" y="1304384"/>
+            <a:ext cx="2089891" cy="2668722"/>
+            <a:chOff x="9140014" y="1316736"/>
+            <a:chExt cx="2089891" cy="2668722"/>
+          </a:xfrm>
+        </p:grpSpPr>
+        <p:sp>
+          <p:nvSpPr>
+            <p:cNvPr id="31" name="Rectangle 30"/>
+            <p:cNvSpPr/>
+            <p:nvPr/>
+          </p:nvSpPr>
+          <p:spPr>
+            <a:xfrm>
+              <a:off x="9410347" y="1484376"/>
+              <a:ext cx="1536192" cy="804672"/>
+            </a:xfrm>
+            <a:prstGeom prst="rect">
+              <a:avLst/>
+            </a:prstGeom>
+            <a:noFill/>
+          </p:spPr>
+          <p:style>
+            <a:lnRef idx="2">
+              <a:schemeClr val="accent1">
+                <a:shade val="50000"/>
+              </a:schemeClr>
+            </a:lnRef>
+            <a:fillRef idx="1">
+              <a:schemeClr val="accent1"/>
+            </a:fillRef>
+            <a:effectRef idx="0">
+              <a:schemeClr val="accent1"/>
+            </a:effectRef>
+            <a:fontRef idx="minor">
+              <a:schemeClr val="lt1"/>
+            </a:fontRef>
+          </p:style>
+          <p:txBody>
+            <a:bodyPr rtlCol="0" anchor="ctr"/>
+            <a:lstStyle/>
+            <a:p>
+              <a:pPr algn="ctr"/>
+              <a:r>
+                <a:rPr lang="en-US" sz="1600" dirty="0" smtClean="0">
+                  <a:solidFill>
+                    <a:schemeClr val="tx1"/>
+                  </a:solidFill>
+                </a:rPr>
+                <a:t>Text/Non-text classification</a:t>
+              </a:r>
+              <a:endParaRPr lang="en-US" sz="1600" dirty="0">
+                <a:solidFill>
+                  <a:schemeClr val="tx1"/>
+                </a:solidFill>
+              </a:endParaRPr>
+            </a:p>
+          </p:txBody>
+        </p:sp>
+        <p:sp>
+          <p:nvSpPr>
+            <p:cNvPr id="32" name="Rectangle 31"/>
+            <p:cNvSpPr/>
+            <p:nvPr/>
+          </p:nvSpPr>
+          <p:spPr>
+            <a:xfrm>
+              <a:off x="9410347" y="2785651"/>
+              <a:ext cx="1536192" cy="804672"/>
+            </a:xfrm>
+            <a:prstGeom prst="rect">
+              <a:avLst/>
+            </a:prstGeom>
+            <a:noFill/>
+          </p:spPr>
+          <p:style>
+            <a:lnRef idx="2">
+              <a:schemeClr val="accent1">
+                <a:shade val="50000"/>
+              </a:schemeClr>
+            </a:lnRef>
+            <a:fillRef idx="1">
+              <a:schemeClr val="accent1"/>
+            </a:fillRef>
+            <a:effectRef idx="0">
+              <a:schemeClr val="accent1"/>
+            </a:effectRef>
+            <a:fontRef idx="minor">
+              <a:schemeClr val="lt1"/>
+            </a:fontRef>
+          </p:style>
+          <p:txBody>
+            <a:bodyPr rtlCol="0" anchor="ctr"/>
+            <a:lstStyle/>
+            <a:p>
+              <a:pPr algn="ctr"/>
+              <a:r>
+                <a:rPr lang="en-US" sz="1600" dirty="0" smtClean="0">
+                  <a:solidFill>
+                    <a:schemeClr val="tx1"/>
+                  </a:solidFill>
+                </a:rPr>
+                <a:t>Bounding Box (Bbox)</a:t>
+              </a:r>
+            </a:p>
+            <a:p>
+              <a:pPr algn="ctr"/>
+              <a:r>
+                <a:rPr lang="en-US" sz="1600" dirty="0" smtClean="0">
+                  <a:solidFill>
+                    <a:schemeClr val="tx1"/>
+                  </a:solidFill>
+                </a:rPr>
+                <a:t>prediction</a:t>
+              </a:r>
+              <a:endParaRPr lang="en-US" sz="1600" dirty="0">
+                <a:solidFill>
+                  <a:schemeClr val="tx1"/>
+                </a:solidFill>
+              </a:endParaRPr>
+            </a:p>
+          </p:txBody>
+        </p:sp>
+        <p:sp>
+          <p:nvSpPr>
+            <p:cNvPr id="59" name="Rectangle 58"/>
+            <p:cNvSpPr/>
+            <p:nvPr/>
+          </p:nvSpPr>
+          <p:spPr>
+            <a:xfrm>
+              <a:off x="9140014" y="1316736"/>
+              <a:ext cx="2089891" cy="2668722"/>
+            </a:xfrm>
+            <a:prstGeom prst="rect">
+              <a:avLst/>
+            </a:prstGeom>
+            <a:noFill/>
+            <a:ln>
+              <a:prstDash val="lgDash"/>
+            </a:ln>
+          </p:spPr>
+          <p:style>
+            <a:lnRef idx="2">
+              <a:schemeClr val="accent1">
+                <a:shade val="50000"/>
+              </a:schemeClr>
+            </a:lnRef>
+            <a:fillRef idx="1">
+              <a:schemeClr val="accent1"/>
+            </a:fillRef>
+            <a:effectRef idx="0">
+              <a:schemeClr val="accent1"/>
+            </a:effectRef>
+            <a:fontRef idx="minor">
+              <a:schemeClr val="lt1"/>
+            </a:fontRef>
+          </p:style>
+          <p:txBody>
+            <a:bodyPr rtlCol="0" anchor="ctr"/>
+            <a:lstStyle/>
+            <a:p>
+              <a:pPr algn="ctr"/>
+              <a:endParaRPr lang="en-US"/>
+            </a:p>
+          </p:txBody>
+        </p:sp>
+        <p:sp>
+          <p:nvSpPr>
+            <p:cNvPr id="60" name="TextBox 59"/>
+            <p:cNvSpPr txBox="1"/>
+            <p:nvPr/>
+          </p:nvSpPr>
+          <p:spPr>
+            <a:xfrm>
+              <a:off x="9140015" y="3639506"/>
+              <a:ext cx="2059924" cy="338554"/>
+            </a:xfrm>
+            <a:prstGeom prst="rect">
+              <a:avLst/>
+            </a:prstGeom>
+            <a:noFill/>
+          </p:spPr>
+          <p:txBody>
+            <a:bodyPr wrap="square" rtlCol="0">
+              <a:spAutoFit/>
+            </a:bodyPr>
+            <a:lstStyle/>
+            <a:p>
+              <a:pPr algn="ctr"/>
+              <a:r>
+                <a:rPr lang="en-US" sz="1600" i="1" dirty="0" smtClean="0"/>
+                <a:t>Model Results</a:t>
+              </a:r>
+              <a:endParaRPr lang="en-US" sz="1600" i="1" dirty="0"/>
+            </a:p>
+          </p:txBody>
+        </p:sp>
+      </p:grpSp>
+      <p:grpSp>
+        <p:nvGrpSpPr>
+          <p:cNvPr id="64" name="Group 63"/>
+          <p:cNvGrpSpPr/>
+          <p:nvPr/>
+        </p:nvGrpSpPr>
+        <p:grpSpPr>
+          <a:xfrm>
+            <a:off x="7223953" y="4447170"/>
+            <a:ext cx="4006367" cy="1405632"/>
+            <a:chOff x="5715587" y="4428240"/>
+            <a:chExt cx="4006367" cy="1405632"/>
+          </a:xfrm>
+        </p:grpSpPr>
+        <p:sp>
+          <p:nvSpPr>
+            <p:cNvPr id="58" name="Rectangle 57"/>
+            <p:cNvSpPr/>
+            <p:nvPr/>
+          </p:nvSpPr>
+          <p:spPr>
+            <a:xfrm>
+              <a:off x="6008843" y="4580323"/>
+              <a:ext cx="1536192" cy="804672"/>
+            </a:xfrm>
+            <a:prstGeom prst="rect">
+              <a:avLst/>
+            </a:prstGeom>
+            <a:noFill/>
+          </p:spPr>
+          <p:style>
+            <a:lnRef idx="2">
+              <a:schemeClr val="accent1">
+                <a:shade val="50000"/>
+              </a:schemeClr>
+            </a:lnRef>
+            <a:fillRef idx="1">
+              <a:schemeClr val="accent1"/>
+            </a:fillRef>
+            <a:effectRef idx="0">
+              <a:schemeClr val="accent1"/>
+            </a:effectRef>
+            <a:fontRef idx="minor">
+              <a:schemeClr val="lt1"/>
+            </a:fontRef>
+          </p:style>
+          <p:txBody>
+            <a:bodyPr rtlCol="0" anchor="ctr"/>
+            <a:lstStyle/>
+            <a:p>
+              <a:pPr algn="ctr"/>
+              <a:r>
+                <a:rPr lang="en-US" sz="1600" dirty="0" smtClean="0">
+                  <a:solidFill>
+                    <a:schemeClr val="tx1"/>
+                  </a:solidFill>
+                </a:rPr>
+                <a:t>mAP-Precision-Recall</a:t>
+              </a:r>
+            </a:p>
+          </p:txBody>
+        </p:sp>
+        <p:sp>
+          <p:nvSpPr>
+            <p:cNvPr id="61" name="Rectangle 60"/>
+            <p:cNvSpPr/>
+            <p:nvPr/>
+          </p:nvSpPr>
+          <p:spPr>
+            <a:xfrm>
+              <a:off x="5715587" y="4428240"/>
+              <a:ext cx="4006367" cy="1405632"/>
+            </a:xfrm>
+            <a:prstGeom prst="rect">
+              <a:avLst/>
+            </a:prstGeom>
+            <a:noFill/>
+            <a:ln>
+              <a:prstDash val="lgDash"/>
+            </a:ln>
+          </p:spPr>
+          <p:style>
+            <a:lnRef idx="2">
+              <a:schemeClr val="accent1">
+                <a:shade val="50000"/>
+              </a:schemeClr>
+            </a:lnRef>
+            <a:fillRef idx="1">
+              <a:schemeClr val="accent1"/>
+            </a:fillRef>
+            <a:effectRef idx="0">
+              <a:schemeClr val="accent1"/>
+            </a:effectRef>
+            <a:fontRef idx="minor">
+              <a:schemeClr val="lt1"/>
+            </a:fontRef>
+          </p:style>
+          <p:txBody>
+            <a:bodyPr rtlCol="0" anchor="ctr"/>
+            <a:lstStyle/>
+            <a:p>
+              <a:pPr algn="ctr"/>
+              <a:endParaRPr lang="en-US"/>
+            </a:p>
+          </p:txBody>
+        </p:sp>
+        <p:sp>
+          <p:nvSpPr>
+            <p:cNvPr id="62" name="Rectangle 61"/>
+            <p:cNvSpPr/>
+            <p:nvPr/>
+          </p:nvSpPr>
+          <p:spPr>
+            <a:xfrm>
+              <a:off x="7955897" y="4564199"/>
+              <a:ext cx="1536192" cy="804672"/>
+            </a:xfrm>
+            <a:prstGeom prst="rect">
+              <a:avLst/>
+            </a:prstGeom>
+            <a:noFill/>
+          </p:spPr>
+          <p:style>
+            <a:lnRef idx="2">
+              <a:schemeClr val="accent1">
+                <a:shade val="50000"/>
+              </a:schemeClr>
+            </a:lnRef>
+            <a:fillRef idx="1">
+              <a:schemeClr val="accent1"/>
+            </a:fillRef>
+            <a:effectRef idx="0">
+              <a:schemeClr val="accent1"/>
+            </a:effectRef>
+            <a:fontRef idx="minor">
+              <a:schemeClr val="lt1"/>
+            </a:fontRef>
+          </p:style>
+          <p:txBody>
+            <a:bodyPr rtlCol="0" anchor="ctr"/>
+            <a:lstStyle/>
+            <a:p>
+              <a:pPr algn="ctr"/>
+              <a:r>
+                <a:rPr lang="en-US" sz="1600" dirty="0" smtClean="0">
+                  <a:solidFill>
+                    <a:schemeClr val="tx1"/>
+                  </a:solidFill>
+                </a:rPr>
+                <a:t>IoU metric</a:t>
+              </a:r>
+              <a:endParaRPr lang="en-US" sz="1600" dirty="0">
+                <a:solidFill>
+                  <a:schemeClr val="tx1"/>
+                </a:solidFill>
+              </a:endParaRPr>
+            </a:p>
+          </p:txBody>
+        </p:sp>
+        <p:sp>
+          <p:nvSpPr>
+            <p:cNvPr id="63" name="TextBox 62"/>
+            <p:cNvSpPr txBox="1"/>
+            <p:nvPr/>
+          </p:nvSpPr>
+          <p:spPr>
+            <a:xfrm>
+              <a:off x="6374667" y="5420844"/>
+              <a:ext cx="3035680" cy="338554"/>
+            </a:xfrm>
+            <a:prstGeom prst="rect">
+              <a:avLst/>
+            </a:prstGeom>
+            <a:noFill/>
+          </p:spPr>
+          <p:txBody>
+            <a:bodyPr wrap="square" rtlCol="0">
+              <a:spAutoFit/>
+            </a:bodyPr>
+            <a:lstStyle/>
+            <a:p>
+              <a:pPr algn="ctr"/>
+              <a:r>
+                <a:rPr lang="en-US" sz="1600" i="1" dirty="0" smtClean="0"/>
+                <a:t>Accuracy metrics computations</a:t>
+              </a:r>
+              <a:endParaRPr lang="en-US" sz="1600" i="1" dirty="0"/>
+            </a:p>
+          </p:txBody>
+        </p:sp>
+      </p:grpSp>
+      <p:sp>
+        <p:nvSpPr>
+          <p:cNvPr id="66" name="TextBox 65"/>
+          <p:cNvSpPr txBox="1"/>
+          <p:nvPr/>
+        </p:nvSpPr>
+        <p:spPr>
+          <a:xfrm>
+            <a:off x="6535024" y="2983831"/>
+            <a:ext cx="1956279" cy="584775"/>
+          </a:xfrm>
+          <a:prstGeom prst="rect">
+            <a:avLst/>
+          </a:prstGeom>
+          <a:noFill/>
+        </p:spPr>
+        <p:txBody>
+          <a:bodyPr wrap="square" rtlCol="0">
+            <a:spAutoFit/>
+          </a:bodyPr>
+          <a:lstStyle/>
+          <a:p>
+            <a:r>
+              <a:rPr lang="en-US" sz="1600" i="1" dirty="0" smtClean="0"/>
+              <a:t>(using </a:t>
+            </a:r>
+          </a:p>
+          <a:p>
+            <a:r>
+              <a:rPr lang="en-US" sz="1600" i="1" dirty="0" smtClean="0"/>
+              <a:t>custom RNN layers)</a:t>
+            </a:r>
+          </a:p>
+        </p:txBody>
+      </p:sp>
+    </p:spTree>
+    <p:extLst>
+      <p:ext uri="{BB962C8B-B14F-4D97-AF65-F5344CB8AC3E}">
+        <p14:creationId xmlns:p14="http://schemas.microsoft.com/office/powerpoint/2010/main" val="3863490349"/>
+      </p:ext>
+    </p:extLst>
+  </p:cSld>
+  <p:clrMapOvr>
+    <a:masterClrMapping/>
+  </p:clrMapOvr>
+</p:sld>
+</file>
+
+<file path=ppt/slides/slide4.xml><?xml version="1.0" encoding="utf-8"?>
+<p:sld xmlns:a="http://schemas.openxmlformats.org/drawingml/2006/main" xmlns:r="http://schemas.openxmlformats.org/officeDocument/2006/relationships" xmlns:p="http://schemas.openxmlformats.org/presentationml/2006/main">
+  <p:cSld>
+    <p:spTree>
+      <p:nvGrpSpPr>
+        <p:cNvPr id="1" name=""/>
+        <p:cNvGrpSpPr/>
+        <p:nvPr/>
+      </p:nvGrpSpPr>
+      <p:grpSpPr>
+        <a:xfrm>
+          <a:off x="0" y="0"/>
+          <a:ext cx="0" cy="0"/>
+          <a:chOff x="0" y="0"/>
+          <a:chExt cx="0" cy="0"/>
+        </a:xfrm>
+      </p:grpSpPr>
+      <p:sp>
+        <p:nvSpPr>
+          <p:cNvPr id="4" name="TextBox 3"/>
+          <p:cNvSpPr txBox="1"/>
+          <p:nvPr/>
+        </p:nvSpPr>
+        <p:spPr>
+          <a:xfrm>
+            <a:off x="685800" y="512064"/>
+            <a:ext cx="8366760" cy="4370427"/>
+          </a:xfrm>
+          <a:prstGeom prst="rect">
+            <a:avLst/>
+          </a:prstGeom>
+          <a:noFill/>
+        </p:spPr>
+        <p:txBody>
+          <a:bodyPr wrap="square" rtlCol="0">
+            <a:spAutoFit/>
+          </a:bodyPr>
+          <a:lstStyle/>
+          <a:p>
+            <a:r>
+              <a:rPr lang="en-US" sz="2000" b="1" dirty="0" smtClean="0"/>
+              <a:t>Existing approaches comparison:</a:t>
+            </a:r>
+          </a:p>
+          <a:p>
+            <a:endParaRPr lang="en-US" sz="2000" dirty="0" smtClean="0"/>
+          </a:p>
+          <a:p>
+            <a:r>
+              <a:rPr lang="en-US" sz="2000" dirty="0" smtClean="0"/>
+              <a:t>Non Deep Learning methods:</a:t>
+            </a:r>
+          </a:p>
+          <a:p>
+            <a:pPr marL="342900" indent="-342900">
+              <a:buFont typeface="Arial" panose="020B0604020202020204" pitchFamily="34" charset="0"/>
+              <a:buChar char="•"/>
+            </a:pPr>
+            <a:r>
+              <a:rPr lang="en-US" sz="2000" dirty="0" smtClean="0"/>
+              <a:t>MRF (Markov Random Field)</a:t>
+            </a:r>
+          </a:p>
+          <a:p>
+            <a:pPr marL="342900" indent="-342900">
+              <a:buFont typeface="Arial" panose="020B0604020202020204" pitchFamily="34" charset="0"/>
+              <a:buChar char="•"/>
+            </a:pPr>
+            <a:r>
+              <a:rPr lang="en-US" sz="2000" dirty="0" smtClean="0"/>
+              <a:t>NESP (Nonlinear Enhancement and Selection of Plane</a:t>
+            </a:r>
+          </a:p>
+          <a:p>
+            <a:pPr marL="342900" indent="-342900">
+              <a:buFont typeface="Arial" panose="020B0604020202020204" pitchFamily="34" charset="0"/>
+              <a:buChar char="•"/>
+            </a:pPr>
+            <a:r>
+              <a:rPr lang="en-US" sz="2000" dirty="0" smtClean="0"/>
+              <a:t>HOG + CRF (Histogram of Oriented Gradients + Conditional Random Field)</a:t>
+            </a:r>
+          </a:p>
+          <a:p>
+            <a:pPr marL="342900" indent="-342900">
+              <a:buFont typeface="Arial" panose="020B0604020202020204" pitchFamily="34" charset="0"/>
+              <a:buChar char="•"/>
+            </a:pPr>
+            <a:r>
+              <a:rPr lang="en-US" sz="2000" dirty="0" smtClean="0"/>
+              <a:t>WFST (Weighted Finite-State Transducer)</a:t>
+            </a:r>
+          </a:p>
+          <a:p>
+            <a:pPr marL="342900" indent="-342900">
+              <a:buFont typeface="Arial" panose="020B0604020202020204" pitchFamily="34" charset="0"/>
+              <a:buChar char="•"/>
+            </a:pPr>
+            <a:endParaRPr lang="en-US" sz="2000" dirty="0"/>
+          </a:p>
+          <a:p>
+            <a:r>
+              <a:rPr lang="en-US" sz="2000" dirty="0" smtClean="0"/>
+              <a:t>Deep Learning methods:</a:t>
+            </a:r>
+          </a:p>
+          <a:p>
+            <a:pPr marL="342900" indent="-342900">
+              <a:buFont typeface="Arial" panose="020B0604020202020204" pitchFamily="34" charset="0"/>
+              <a:buChar char="•"/>
+            </a:pPr>
+            <a:r>
+              <a:rPr lang="en-US" sz="2000" dirty="0" smtClean="0"/>
+              <a:t>CNN (Convolutional Neural Network)</a:t>
+            </a:r>
+          </a:p>
+          <a:p>
+            <a:pPr marL="342900" indent="-342900">
+              <a:buFont typeface="Arial" panose="020B0604020202020204" pitchFamily="34" charset="0"/>
+              <a:buChar char="•"/>
+            </a:pPr>
+            <a:r>
+              <a:rPr lang="en-US" sz="2000" dirty="0" smtClean="0"/>
+              <a:t>RNN (Recurrent Neural Network)</a:t>
+            </a:r>
+          </a:p>
+          <a:p>
+            <a:pPr marL="342900" indent="-342900">
+              <a:buFont typeface="Arial" panose="020B0604020202020204" pitchFamily="34" charset="0"/>
+              <a:buChar char="•"/>
+            </a:pPr>
+            <a:r>
+              <a:rPr lang="en-US" sz="2000" dirty="0" smtClean="0"/>
+              <a:t>RCNN (Recurrent CNN) with backbone (resnet101, resnet50)</a:t>
+            </a:r>
+          </a:p>
+          <a:p>
+            <a:pPr marL="342900" indent="-342900">
+              <a:buFont typeface="Arial" panose="020B0604020202020204" pitchFamily="34" charset="0"/>
+              <a:buChar char="•"/>
+            </a:pPr>
+            <a:r>
+              <a:rPr lang="en-US" sz="2000" dirty="0" smtClean="0"/>
+              <a:t>Mask-RCNN with backbone (resnet101, resnet50)</a:t>
+            </a:r>
+            <a:endParaRPr lang="en-US" sz="2000" dirty="0"/>
+          </a:p>
+          <a:p>
+            <a:pPr marL="285750" indent="-285750">
+              <a:buFont typeface="Arial" panose="020B0604020202020204" pitchFamily="34" charset="0"/>
+              <a:buChar char="•"/>
+            </a:pPr>
+            <a:endParaRPr lang="en-US" dirty="0" smtClean="0"/>
+          </a:p>
+        </p:txBody>
+      </p:sp>
+      <p:pic>
+        <p:nvPicPr>
+          <p:cNvPr id="5" name="Picture 4">
+            <a:extLst>
+              <a:ext uri="{FF2B5EF4-FFF2-40B4-BE49-F238E27FC236}">
+                <a16:creationId xmlns:a16="http://schemas.microsoft.com/office/drawing/2014/main" xmlns="" id="{4F123114-E0DF-4542-9867-FE12447B6DCE}"/>
+              </a:ext>
+            </a:extLst>
+          </p:cNvPr>
+          <p:cNvPicPr>
+            <a:picLocks noChangeAspect="1"/>
+          </p:cNvPicPr>
+          <p:nvPr/>
+        </p:nvPicPr>
+        <p:blipFill>
+          <a:blip r:embed="rId2" cstate="print">
+            <a:extLst>
+              <a:ext uri="{28A0092B-C50C-407E-A947-70E740481C1C}">
+                <a14:useLocalDpi xmlns:a14="http://schemas.microsoft.com/office/drawing/2010/main" val="0"/>
+              </a:ext>
+            </a:extLst>
+          </a:blip>
+          <a:stretch>
+            <a:fillRect/>
+          </a:stretch>
+        </p:blipFill>
+        <p:spPr>
+          <a:xfrm>
+            <a:off x="11199939" y="141722"/>
+            <a:ext cx="831672" cy="831672"/>
+          </a:xfrm>
+          <a:prstGeom prst="rect">
+            <a:avLst/>
+          </a:prstGeom>
+        </p:spPr>
+      </p:pic>
     </p:spTree>
     <p:extLst>
       <p:ext uri="{BB962C8B-B14F-4D97-AF65-F5344CB8AC3E}">
@@ -3433,7 +4625,7 @@
 </p:sld>
 </file>
 
-<file path=ppt/slides/slide4.xml><?xml version="1.0" encoding="utf-8"?>
+<file path=ppt/slides/slide5.xml><?xml version="1.0" encoding="utf-8"?>
 <p:sld xmlns:a="http://schemas.openxmlformats.org/drawingml/2006/main" xmlns:r="http://schemas.openxmlformats.org/officeDocument/2006/relationships" xmlns:p="http://schemas.openxmlformats.org/presentationml/2006/main">
   <p:cSld>
     <p:spTree>
@@ -4160,7 +5352,7 @@
           <p:cNvPr id="28" name="Picture 27">
             <a:extLst>
               <a:ext uri="{FF2B5EF4-FFF2-40B4-BE49-F238E27FC236}">
-                <a16:creationId xmlns="" xmlns:a16="http://schemas.microsoft.com/office/drawing/2014/main" id="{4F123114-E0DF-4542-9867-FE12447B6DCE}"/>
+                <a16:creationId xmlns:a16="http://schemas.microsoft.com/office/drawing/2014/main" xmlns="" id="{4F123114-E0DF-4542-9867-FE12447B6DCE}"/>
               </a:ext>
             </a:extLst>
           </p:cNvPr>
@@ -4237,7 +5429,7 @@
 </p:sld>
 </file>
 
-<file path=ppt/slides/slide5.xml><?xml version="1.0" encoding="utf-8"?>
+<file path=ppt/slides/slide6.xml><?xml version="1.0" encoding="utf-8"?>
 <p:sld xmlns:a="http://schemas.openxmlformats.org/drawingml/2006/main" xmlns:r="http://schemas.openxmlformats.org/officeDocument/2006/relationships" xmlns:p="http://schemas.openxmlformats.org/presentationml/2006/main">
   <p:cSld>
     <p:spTree>
@@ -4374,7 +5566,7 @@
           <p:cNvPr id="5" name="Picture 4">
             <a:extLst>
               <a:ext uri="{FF2B5EF4-FFF2-40B4-BE49-F238E27FC236}">
-                <a16:creationId xmlns="" xmlns:a16="http://schemas.microsoft.com/office/drawing/2014/main" id="{4F123114-E0DF-4542-9867-FE12447B6DCE}"/>
+                <a16:creationId xmlns:a16="http://schemas.microsoft.com/office/drawing/2014/main" xmlns="" id="{4F123114-E0DF-4542-9867-FE12447B6DCE}"/>
               </a:ext>
             </a:extLst>
           </p:cNvPr>
@@ -4418,7 +5610,7 @@
 </p:sld>
 </file>
 
-<file path=ppt/slides/slide6.xml><?xml version="1.0" encoding="utf-8"?>
+<file path=ppt/slides/slide7.xml><?xml version="1.0" encoding="utf-8"?>
 <p:sld xmlns:a="http://schemas.openxmlformats.org/drawingml/2006/main" xmlns:r="http://schemas.openxmlformats.org/officeDocument/2006/relationships" xmlns:p="http://schemas.openxmlformats.org/presentationml/2006/main">
   <p:cSld>
     <p:spTree>
@@ -4580,7 +5772,7 @@
           <p:cNvPr id="5" name="Picture 4">
             <a:extLst>
               <a:ext uri="{FF2B5EF4-FFF2-40B4-BE49-F238E27FC236}">
-                <a16:creationId xmlns="" xmlns:a16="http://schemas.microsoft.com/office/drawing/2014/main" id="{4F123114-E0DF-4542-9867-FE12447B6DCE}"/>
+                <a16:creationId xmlns:a16="http://schemas.microsoft.com/office/drawing/2014/main" xmlns="" id="{4F123114-E0DF-4542-9867-FE12447B6DCE}"/>
               </a:ext>
             </a:extLst>
           </p:cNvPr>

</xml_diff>

<commit_message>
New research papers are added; Objective doc has been added
</commit_message>
<xml_diff>
--- a/Documents/Study/Project_Presentation.pptx
+++ b/Documents/Study/Project_Presentation.pptx
@@ -12,6 +12,7 @@
     <p:sldId id="259" r:id="rId6"/>
     <p:sldId id="260" r:id="rId7"/>
     <p:sldId id="261" r:id="rId8"/>
+    <p:sldId id="263" r:id="rId9"/>
   </p:sldIdLst>
   <p:sldSz cx="12192000" cy="6858000"/>
   <p:notesSz cx="6858000" cy="9144000"/>
@@ -249,7 +250,7 @@
           <a:p>
             <a:fld id="{75507C98-8ED6-4F4D-BBFA-74E792F1F6FB}" type="datetimeFigureOut">
               <a:rPr lang="en-US" smtClean="0"/>
-              <a:t>5/22/2022</a:t>
+              <a:t>6/7/2022</a:t>
             </a:fld>
             <a:endParaRPr lang="en-US"/>
           </a:p>
@@ -419,7 +420,7 @@
           <a:p>
             <a:fld id="{75507C98-8ED6-4F4D-BBFA-74E792F1F6FB}" type="datetimeFigureOut">
               <a:rPr lang="en-US" smtClean="0"/>
-              <a:t>5/22/2022</a:t>
+              <a:t>6/7/2022</a:t>
             </a:fld>
             <a:endParaRPr lang="en-US"/>
           </a:p>
@@ -599,7 +600,7 @@
           <a:p>
             <a:fld id="{75507C98-8ED6-4F4D-BBFA-74E792F1F6FB}" type="datetimeFigureOut">
               <a:rPr lang="en-US" smtClean="0"/>
-              <a:t>5/22/2022</a:t>
+              <a:t>6/7/2022</a:t>
             </a:fld>
             <a:endParaRPr lang="en-US"/>
           </a:p>
@@ -769,7 +770,7 @@
           <a:p>
             <a:fld id="{75507C98-8ED6-4F4D-BBFA-74E792F1F6FB}" type="datetimeFigureOut">
               <a:rPr lang="en-US" smtClean="0"/>
-              <a:t>5/22/2022</a:t>
+              <a:t>6/7/2022</a:t>
             </a:fld>
             <a:endParaRPr lang="en-US"/>
           </a:p>
@@ -1015,7 +1016,7 @@
           <a:p>
             <a:fld id="{75507C98-8ED6-4F4D-BBFA-74E792F1F6FB}" type="datetimeFigureOut">
               <a:rPr lang="en-US" smtClean="0"/>
-              <a:t>5/22/2022</a:t>
+              <a:t>6/7/2022</a:t>
             </a:fld>
             <a:endParaRPr lang="en-US"/>
           </a:p>
@@ -1247,7 +1248,7 @@
           <a:p>
             <a:fld id="{75507C98-8ED6-4F4D-BBFA-74E792F1F6FB}" type="datetimeFigureOut">
               <a:rPr lang="en-US" smtClean="0"/>
-              <a:t>5/22/2022</a:t>
+              <a:t>6/7/2022</a:t>
             </a:fld>
             <a:endParaRPr lang="en-US"/>
           </a:p>
@@ -1614,7 +1615,7 @@
           <a:p>
             <a:fld id="{75507C98-8ED6-4F4D-BBFA-74E792F1F6FB}" type="datetimeFigureOut">
               <a:rPr lang="en-US" smtClean="0"/>
-              <a:t>5/22/2022</a:t>
+              <a:t>6/7/2022</a:t>
             </a:fld>
             <a:endParaRPr lang="en-US"/>
           </a:p>
@@ -1732,7 +1733,7 @@
           <a:p>
             <a:fld id="{75507C98-8ED6-4F4D-BBFA-74E792F1F6FB}" type="datetimeFigureOut">
               <a:rPr lang="en-US" smtClean="0"/>
-              <a:t>5/22/2022</a:t>
+              <a:t>6/7/2022</a:t>
             </a:fld>
             <a:endParaRPr lang="en-US"/>
           </a:p>
@@ -1827,7 +1828,7 @@
           <a:p>
             <a:fld id="{75507C98-8ED6-4F4D-BBFA-74E792F1F6FB}" type="datetimeFigureOut">
               <a:rPr lang="en-US" smtClean="0"/>
-              <a:t>5/22/2022</a:t>
+              <a:t>6/7/2022</a:t>
             </a:fld>
             <a:endParaRPr lang="en-US"/>
           </a:p>
@@ -2104,7 +2105,7 @@
           <a:p>
             <a:fld id="{75507C98-8ED6-4F4D-BBFA-74E792F1F6FB}" type="datetimeFigureOut">
               <a:rPr lang="en-US" smtClean="0"/>
-              <a:t>5/22/2022</a:t>
+              <a:t>6/7/2022</a:t>
             </a:fld>
             <a:endParaRPr lang="en-US"/>
           </a:p>
@@ -2357,7 +2358,7 @@
           <a:p>
             <a:fld id="{75507C98-8ED6-4F4D-BBFA-74E792F1F6FB}" type="datetimeFigureOut">
               <a:rPr lang="en-US" smtClean="0"/>
-              <a:t>5/22/2022</a:t>
+              <a:t>6/7/2022</a:t>
             </a:fld>
             <a:endParaRPr lang="en-US"/>
           </a:p>
@@ -2570,7 +2571,7 @@
           <a:p>
             <a:fld id="{75507C98-8ED6-4F4D-BBFA-74E792F1F6FB}" type="datetimeFigureOut">
               <a:rPr lang="en-US" smtClean="0"/>
-              <a:t>5/22/2022</a:t>
+              <a:t>6/7/2022</a:t>
             </a:fld>
             <a:endParaRPr lang="en-US"/>
           </a:p>
@@ -3008,7 +3009,7 @@
           <p:cNvPr id="4" name="Picture 3">
             <a:extLst>
               <a:ext uri="{FF2B5EF4-FFF2-40B4-BE49-F238E27FC236}">
-                <a16:creationId xmlns:a16="http://schemas.microsoft.com/office/drawing/2014/main" xmlns="" id="{4F123114-E0DF-4542-9867-FE12447B6DCE}"/>
+                <a16:creationId xmlns="" xmlns:a16="http://schemas.microsoft.com/office/drawing/2014/main" id="{4F123114-E0DF-4542-9867-FE12447B6DCE}"/>
               </a:ext>
             </a:extLst>
           </p:cNvPr>
@@ -3177,7 +3178,7 @@
           <p:cNvPr id="5" name="Picture 4">
             <a:extLst>
               <a:ext uri="{FF2B5EF4-FFF2-40B4-BE49-F238E27FC236}">
-                <a16:creationId xmlns:a16="http://schemas.microsoft.com/office/drawing/2014/main" xmlns="" id="{4F123114-E0DF-4542-9867-FE12447B6DCE}"/>
+                <a16:creationId xmlns="" xmlns:a16="http://schemas.microsoft.com/office/drawing/2014/main" id="{4F123114-E0DF-4542-9867-FE12447B6DCE}"/>
               </a:ext>
             </a:extLst>
           </p:cNvPr>
@@ -3262,13 +3263,8 @@
           <a:p>
             <a:r>
               <a:rPr lang="en-US" sz="2000" b="1" dirty="0" smtClean="0"/>
-              <a:t>Block Diagram</a:t>
-            </a:r>
-            <a:r>
-              <a:rPr lang="en-US" sz="2000" b="1" dirty="0" smtClean="0"/>
-              <a:t>:</a:t>
-            </a:r>
-            <a:endParaRPr lang="en-US" sz="2000" b="1" dirty="0" smtClean="0"/>
+              <a:t>Block Diagram:</a:t>
+            </a:r>
           </a:p>
         </p:txBody>
       </p:sp>
@@ -3277,7 +3273,7 @@
           <p:cNvPr id="5" name="Picture 4">
             <a:extLst>
               <a:ext uri="{FF2B5EF4-FFF2-40B4-BE49-F238E27FC236}">
-                <a16:creationId xmlns:a16="http://schemas.microsoft.com/office/drawing/2014/main" xmlns="" id="{4F123114-E0DF-4542-9867-FE12447B6DCE}"/>
+                <a16:creationId xmlns="" xmlns:a16="http://schemas.microsoft.com/office/drawing/2014/main" id="{4F123114-E0DF-4542-9867-FE12447B6DCE}"/>
               </a:ext>
             </a:extLst>
           </p:cNvPr>
@@ -4446,7 +4442,7 @@
         <p:spPr>
           <a:xfrm>
             <a:off x="685800" y="512064"/>
-            <a:ext cx="8366760" cy="4370427"/>
+            <a:ext cx="8366760" cy="4985980"/>
           </a:xfrm>
           <a:prstGeom prst="rect">
             <a:avLst/>
@@ -4563,7 +4559,35 @@
             </a:pPr>
             <a:r>
               <a:rPr lang="en-US" sz="2000" dirty="0" smtClean="0"/>
-              <a:t>Mask-RCNN with backbone (resnet101, resnet50)</a:t>
+              <a:t>Mask-RCNN with backbone (resnet101, resnet50</a:t>
+            </a:r>
+            <a:r>
+              <a:rPr lang="en-US" sz="2000" dirty="0" smtClean="0"/>
+              <a:t>)</a:t>
+            </a:r>
+          </a:p>
+          <a:p>
+            <a:pPr marL="342900" indent="-342900">
+              <a:buFont typeface="Arial" panose="020B0604020202020204" pitchFamily="34" charset="0"/>
+              <a:buChar char="•"/>
+            </a:pPr>
+            <a:r>
+              <a:rPr lang="en-US" sz="2000" dirty="0" err="1" smtClean="0"/>
+              <a:t>Autoencoders</a:t>
+            </a:r>
+            <a:r>
+              <a:rPr lang="en-US" sz="2000" dirty="0" smtClean="0"/>
+              <a:t> using LSTM</a:t>
+            </a:r>
+          </a:p>
+          <a:p>
+            <a:pPr marL="342900" indent="-342900">
+              <a:buFont typeface="Arial" panose="020B0604020202020204" pitchFamily="34" charset="0"/>
+              <a:buChar char="•"/>
+            </a:pPr>
+            <a:r>
+              <a:rPr lang="en-US" sz="2000" dirty="0" smtClean="0"/>
+              <a:t>Sequence-to-sequence using RNN</a:t>
             </a:r>
             <a:endParaRPr lang="en-US" sz="2000" dirty="0"/>
           </a:p>
@@ -4581,7 +4605,7 @@
           <p:cNvPr id="5" name="Picture 4">
             <a:extLst>
               <a:ext uri="{FF2B5EF4-FFF2-40B4-BE49-F238E27FC236}">
-                <a16:creationId xmlns:a16="http://schemas.microsoft.com/office/drawing/2014/main" xmlns="" id="{4F123114-E0DF-4542-9867-FE12447B6DCE}"/>
+                <a16:creationId xmlns="" xmlns:a16="http://schemas.microsoft.com/office/drawing/2014/main" id="{4F123114-E0DF-4542-9867-FE12447B6DCE}"/>
               </a:ext>
             </a:extLst>
           </p:cNvPr>
@@ -5352,7 +5376,7 @@
           <p:cNvPr id="28" name="Picture 27">
             <a:extLst>
               <a:ext uri="{FF2B5EF4-FFF2-40B4-BE49-F238E27FC236}">
-                <a16:creationId xmlns:a16="http://schemas.microsoft.com/office/drawing/2014/main" xmlns="" id="{4F123114-E0DF-4542-9867-FE12447B6DCE}"/>
+                <a16:creationId xmlns="" xmlns:a16="http://schemas.microsoft.com/office/drawing/2014/main" id="{4F123114-E0DF-4542-9867-FE12447B6DCE}"/>
               </a:ext>
             </a:extLst>
           </p:cNvPr>
@@ -5566,7 +5590,7 @@
           <p:cNvPr id="5" name="Picture 4">
             <a:extLst>
               <a:ext uri="{FF2B5EF4-FFF2-40B4-BE49-F238E27FC236}">
-                <a16:creationId xmlns:a16="http://schemas.microsoft.com/office/drawing/2014/main" xmlns="" id="{4F123114-E0DF-4542-9867-FE12447B6DCE}"/>
+                <a16:creationId xmlns="" xmlns:a16="http://schemas.microsoft.com/office/drawing/2014/main" id="{4F123114-E0DF-4542-9867-FE12447B6DCE}"/>
               </a:ext>
             </a:extLst>
           </p:cNvPr>
@@ -5636,7 +5660,7 @@
         <p:spPr>
           <a:xfrm>
             <a:off x="685800" y="512064"/>
-            <a:ext cx="8366760" cy="4678204"/>
+            <a:ext cx="8366760" cy="3293209"/>
           </a:xfrm>
           <a:prstGeom prst="rect">
             <a:avLst/>
@@ -5668,6 +5692,22 @@
               <a:rPr lang="en-US" sz="2000" dirty="0" smtClean="0"/>
               <a:t> </a:t>
             </a:r>
+            <a:endParaRPr lang="en-US" sz="2000" dirty="0" smtClean="0"/>
+          </a:p>
+          <a:p>
+            <a:r>
+              <a:rPr lang="en-US" sz="2000" dirty="0" smtClean="0"/>
+              <a:t>Tools </a:t>
+            </a:r>
+            <a:r>
+              <a:rPr lang="en-US" sz="2000" dirty="0"/>
+              <a:t>to be used</a:t>
+            </a:r>
+            <a:r>
+              <a:rPr lang="en-US" sz="2000" dirty="0" smtClean="0"/>
+              <a:t>:</a:t>
+            </a:r>
+            <a:endParaRPr lang="en-US" sz="2000" dirty="0" smtClean="0"/>
           </a:p>
           <a:p>
             <a:pPr marL="342900" indent="-342900">
@@ -5675,7 +5715,7 @@
               <a:buChar char="•"/>
             </a:pPr>
             <a:r>
-              <a:rPr lang="en-US" sz="2000" dirty="0" smtClean="0"/>
+              <a:rPr lang="en-US" dirty="0" smtClean="0"/>
               <a:t>Python 3.9</a:t>
             </a:r>
           </a:p>
@@ -5685,7 +5725,7 @@
               <a:buChar char="•"/>
             </a:pPr>
             <a:r>
-              <a:rPr lang="en-US" sz="2000" dirty="0" smtClean="0"/>
+              <a:rPr lang="en-US" dirty="0" smtClean="0"/>
               <a:t>Tensorflow</a:t>
             </a:r>
           </a:p>
@@ -5695,7 +5735,7 @@
               <a:buChar char="•"/>
             </a:pPr>
             <a:r>
-              <a:rPr lang="en-US" sz="2000" dirty="0" smtClean="0"/>
+              <a:rPr lang="en-US" dirty="0" smtClean="0"/>
               <a:t>Keras</a:t>
             </a:r>
           </a:p>
@@ -5705,7 +5745,7 @@
               <a:buChar char="•"/>
             </a:pPr>
             <a:r>
-              <a:rPr lang="en-US" sz="2000" dirty="0" smtClean="0"/>
+              <a:rPr lang="en-US" dirty="0" smtClean="0"/>
               <a:t>Scikit-Image</a:t>
             </a:r>
           </a:p>
@@ -5715,17 +5755,8 @@
               <a:buChar char="•"/>
             </a:pPr>
             <a:r>
-              <a:rPr lang="en-US" sz="2000" dirty="0" smtClean="0"/>
+              <a:rPr lang="en-US" dirty="0" smtClean="0"/>
               <a:t>OpenCV</a:t>
-            </a:r>
-          </a:p>
-          <a:p>
-            <a:endParaRPr lang="en-US" sz="2000" dirty="0"/>
-          </a:p>
-          <a:p>
-            <a:r>
-              <a:rPr lang="en-US" sz="2000" dirty="0" smtClean="0"/>
-              <a:t>IDEs to be used:</a:t>
             </a:r>
           </a:p>
           <a:p>
@@ -5734,35 +5765,9 @@
               <a:buChar char="•"/>
             </a:pPr>
             <a:r>
-              <a:rPr lang="en-US" sz="2000" dirty="0" smtClean="0"/>
-              <a:t>Anaconda</a:t>
-            </a:r>
-          </a:p>
-          <a:p>
-            <a:pPr marL="342900" indent="-342900">
-              <a:buFont typeface="Arial" panose="020B0604020202020204" pitchFamily="34" charset="0"/>
-              <a:buChar char="•"/>
-            </a:pPr>
-            <a:r>
-              <a:rPr lang="en-US" sz="2000" dirty="0" smtClean="0"/>
-              <a:t>Visual Studio Code</a:t>
-            </a:r>
-          </a:p>
-          <a:p>
-            <a:pPr marL="342900" indent="-342900">
-              <a:buFont typeface="Arial" panose="020B0604020202020204" pitchFamily="34" charset="0"/>
-              <a:buChar char="•"/>
-            </a:pPr>
-            <a:r>
-              <a:rPr lang="en-US" sz="2000" dirty="0" smtClean="0"/>
-              <a:t>Jupyter notebook</a:t>
-            </a:r>
-          </a:p>
-          <a:p>
-            <a:pPr marL="285750" indent="-285750">
-              <a:buFont typeface="Arial" panose="020B0604020202020204" pitchFamily="34" charset="0"/>
-              <a:buChar char="•"/>
-            </a:pPr>
+              <a:rPr lang="en-US" dirty="0" smtClean="0"/>
+              <a:t>PIL(Pillow)</a:t>
+            </a:r>
             <a:endParaRPr lang="en-US" dirty="0" smtClean="0"/>
           </a:p>
         </p:txBody>
@@ -5772,7 +5777,7 @@
           <p:cNvPr id="5" name="Picture 4">
             <a:extLst>
               <a:ext uri="{FF2B5EF4-FFF2-40B4-BE49-F238E27FC236}">
-                <a16:creationId xmlns:a16="http://schemas.microsoft.com/office/drawing/2014/main" xmlns="" id="{4F123114-E0DF-4542-9867-FE12447B6DCE}"/>
+                <a16:creationId xmlns="" xmlns:a16="http://schemas.microsoft.com/office/drawing/2014/main" id="{4F123114-E0DF-4542-9867-FE12447B6DCE}"/>
               </a:ext>
             </a:extLst>
           </p:cNvPr>
@@ -5805,45 +5810,213 @@
       </p:pic>
       <p:sp>
         <p:nvSpPr>
-          <p:cNvPr id="2" name="TextBox 1"/>
-          <p:cNvSpPr txBox="1"/>
+          <p:cNvPr id="6" name="Rectangle 5"/>
+          <p:cNvSpPr/>
           <p:nvPr/>
         </p:nvSpPr>
         <p:spPr>
           <a:xfrm>
-            <a:off x="2615184" y="5327428"/>
-            <a:ext cx="7616952" cy="400110"/>
+            <a:off x="3581400" y="1740700"/>
+            <a:ext cx="2814828" cy="1200329"/>
           </a:xfrm>
           <a:prstGeom prst="rect">
             <a:avLst/>
           </a:prstGeom>
         </p:spPr>
+        <p:txBody>
+          <a:bodyPr wrap="square">
+            <a:spAutoFit/>
+          </a:bodyPr>
+          <a:lstStyle/>
+          <a:p>
+            <a:r>
+              <a:rPr lang="en-US" dirty="0"/>
+              <a:t>IDEs to be used:</a:t>
+            </a:r>
+          </a:p>
+          <a:p>
+            <a:pPr marL="342900" indent="-342900">
+              <a:buFont typeface="Arial" panose="020B0604020202020204" pitchFamily="34" charset="0"/>
+              <a:buChar char="•"/>
+            </a:pPr>
+            <a:r>
+              <a:rPr lang="en-US" dirty="0"/>
+              <a:t>Anaconda</a:t>
+            </a:r>
+          </a:p>
+          <a:p>
+            <a:pPr marL="342900" indent="-342900">
+              <a:buFont typeface="Arial" panose="020B0604020202020204" pitchFamily="34" charset="0"/>
+              <a:buChar char="•"/>
+            </a:pPr>
+            <a:r>
+              <a:rPr lang="en-US" dirty="0"/>
+              <a:t>Visual Studio Code</a:t>
+            </a:r>
+          </a:p>
+          <a:p>
+            <a:pPr marL="342900" indent="-342900">
+              <a:buFont typeface="Arial" panose="020B0604020202020204" pitchFamily="34" charset="0"/>
+              <a:buChar char="•"/>
+            </a:pPr>
+            <a:r>
+              <a:rPr lang="en-US" dirty="0"/>
+              <a:t>Jupyter notebook</a:t>
+            </a:r>
+          </a:p>
+        </p:txBody>
+      </p:sp>
+      <p:sp>
+        <p:nvSpPr>
+          <p:cNvPr id="7" name="Rectangle 6"/>
+          <p:cNvSpPr/>
+          <p:nvPr/>
+        </p:nvSpPr>
+        <p:spPr>
+          <a:xfrm>
+            <a:off x="685800" y="5376672"/>
+            <a:ext cx="10506456" cy="548640"/>
+          </a:xfrm>
+          <a:prstGeom prst="rect">
+            <a:avLst/>
+          </a:prstGeom>
+          <a:solidFill>
+            <a:srgbClr val="FFFF00"/>
+          </a:solidFill>
+        </p:spPr>
         <p:style>
           <a:lnRef idx="2">
-            <a:schemeClr val="accent1"/>
+            <a:schemeClr val="accent1">
+              <a:shade val="50000"/>
+            </a:schemeClr>
           </a:lnRef>
           <a:fillRef idx="1">
-            <a:schemeClr val="lt1"/>
+            <a:schemeClr val="accent1"/>
           </a:fillRef>
           <a:effectRef idx="0">
             <a:schemeClr val="accent1"/>
           </a:effectRef>
           <a:fontRef idx="minor">
-            <a:schemeClr val="dk1"/>
+            <a:schemeClr val="lt1"/>
           </a:fontRef>
         </p:style>
         <p:txBody>
-          <a:bodyPr wrap="square" rtlCol="0">
-            <a:spAutoFit/>
-          </a:bodyPr>
+          <a:bodyPr rtlCol="0" anchor="ctr"/>
           <a:lstStyle/>
           <a:p>
             <a:pPr algn="ctr"/>
             <a:r>
-              <a:rPr lang="en-US" sz="2000" dirty="0" smtClean="0"/>
-              <a:t>Code preparation has been started and collecting sample codes</a:t>
-            </a:r>
-            <a:endParaRPr lang="en-US" sz="2000" dirty="0"/>
+              <a:rPr lang="en-US" dirty="0">
+                <a:solidFill>
+                  <a:schemeClr val="tx1"/>
+                </a:solidFill>
+              </a:rPr>
+              <a:t>CNN feature extraction explained: </a:t>
+            </a:r>
+            <a:r>
+              <a:rPr lang="en-US" dirty="0">
+                <a:solidFill>
+                  <a:schemeClr val="tx1"/>
+                </a:solidFill>
+                <a:hlinkClick r:id="rId3"/>
+              </a:rPr>
+              <a:t>https://ujjwalkarn.me/2016/08/11/intuitive-explanation-convnets</a:t>
+            </a:r>
+            <a:r>
+              <a:rPr lang="en-US" dirty="0" smtClean="0">
+                <a:solidFill>
+                  <a:schemeClr val="tx1"/>
+                </a:solidFill>
+                <a:hlinkClick r:id="rId3"/>
+              </a:rPr>
+              <a:t>/</a:t>
+            </a:r>
+            <a:endParaRPr lang="en-US" dirty="0" smtClean="0">
+              <a:solidFill>
+                <a:schemeClr val="tx1"/>
+              </a:solidFill>
+            </a:endParaRPr>
+          </a:p>
+        </p:txBody>
+      </p:sp>
+      <p:sp>
+        <p:nvSpPr>
+          <p:cNvPr id="9" name="Rectangle 8"/>
+          <p:cNvSpPr/>
+          <p:nvPr/>
+        </p:nvSpPr>
+        <p:spPr>
+          <a:xfrm>
+            <a:off x="685800" y="4636425"/>
+            <a:ext cx="10506456" cy="548640"/>
+          </a:xfrm>
+          <a:prstGeom prst="rect">
+            <a:avLst/>
+          </a:prstGeom>
+          <a:solidFill>
+            <a:srgbClr val="FFFF00"/>
+          </a:solidFill>
+        </p:spPr>
+        <p:style>
+          <a:lnRef idx="2">
+            <a:schemeClr val="accent1">
+              <a:shade val="50000"/>
+            </a:schemeClr>
+          </a:lnRef>
+          <a:fillRef idx="1">
+            <a:schemeClr val="accent1"/>
+          </a:fillRef>
+          <a:effectRef idx="0">
+            <a:schemeClr val="accent1"/>
+          </a:effectRef>
+          <a:fontRef idx="minor">
+            <a:schemeClr val="lt1"/>
+          </a:fontRef>
+        </p:style>
+        <p:txBody>
+          <a:bodyPr rtlCol="0" anchor="ctr"/>
+          <a:lstStyle/>
+          <a:p>
+            <a:pPr algn="ctr"/>
+            <a:r>
+              <a:rPr lang="en-US" dirty="0" smtClean="0">
+                <a:solidFill>
+                  <a:schemeClr val="tx1"/>
+                </a:solidFill>
+              </a:rPr>
+              <a:t>Resnt50 Architecture explained</a:t>
+            </a:r>
+            <a:r>
+              <a:rPr lang="en-US" dirty="0">
+                <a:solidFill>
+                  <a:schemeClr val="tx1"/>
+                </a:solidFill>
+              </a:rPr>
+              <a:t>: </a:t>
+            </a:r>
+            <a:r>
+              <a:rPr lang="en-US" dirty="0">
+                <a:solidFill>
+                  <a:schemeClr val="tx1"/>
+                </a:solidFill>
+                <a:hlinkClick r:id="rId4"/>
+              </a:rPr>
+              <a:t>https://iq.opengenus.org/resnet50-architecture</a:t>
+            </a:r>
+            <a:r>
+              <a:rPr lang="en-US" dirty="0" smtClean="0">
+                <a:solidFill>
+                  <a:schemeClr val="tx1"/>
+                </a:solidFill>
+                <a:hlinkClick r:id="rId4"/>
+              </a:rPr>
+              <a:t>/</a:t>
+            </a:r>
+            <a:endParaRPr lang="en-US" dirty="0" smtClean="0">
+              <a:solidFill>
+                <a:schemeClr val="tx1"/>
+              </a:solidFill>
+            </a:endParaRPr>
           </a:p>
         </p:txBody>
       </p:sp>
@@ -5851,6 +6024,603 @@
     <p:extLst>
       <p:ext uri="{BB962C8B-B14F-4D97-AF65-F5344CB8AC3E}">
         <p14:creationId xmlns:p14="http://schemas.microsoft.com/office/powerpoint/2010/main" val="3217492519"/>
+      </p:ext>
+    </p:extLst>
+  </p:cSld>
+  <p:clrMapOvr>
+    <a:masterClrMapping/>
+  </p:clrMapOvr>
+</p:sld>
+</file>
+
+<file path=ppt/slides/slide8.xml><?xml version="1.0" encoding="utf-8"?>
+<p:sld xmlns:a="http://schemas.openxmlformats.org/drawingml/2006/main" xmlns:r="http://schemas.openxmlformats.org/officeDocument/2006/relationships" xmlns:p="http://schemas.openxmlformats.org/presentationml/2006/main">
+  <p:cSld>
+    <p:spTree>
+      <p:nvGrpSpPr>
+        <p:cNvPr id="1" name=""/>
+        <p:cNvGrpSpPr/>
+        <p:nvPr/>
+      </p:nvGrpSpPr>
+      <p:grpSpPr>
+        <a:xfrm>
+          <a:off x="0" y="0"/>
+          <a:ext cx="0" cy="0"/>
+          <a:chOff x="0" y="0"/>
+          <a:chExt cx="0" cy="0"/>
+        </a:xfrm>
+      </p:grpSpPr>
+      <p:sp>
+        <p:nvSpPr>
+          <p:cNvPr id="5" name="TextBox 4"/>
+          <p:cNvSpPr txBox="1"/>
+          <p:nvPr/>
+        </p:nvSpPr>
+        <p:spPr>
+          <a:xfrm>
+            <a:off x="685800" y="512064"/>
+            <a:ext cx="10140696" cy="5139869"/>
+          </a:xfrm>
+          <a:prstGeom prst="rect">
+            <a:avLst/>
+          </a:prstGeom>
+          <a:noFill/>
+        </p:spPr>
+        <p:txBody>
+          <a:bodyPr wrap="square" rtlCol="0">
+            <a:spAutoFit/>
+          </a:bodyPr>
+          <a:lstStyle/>
+          <a:p>
+            <a:r>
+              <a:rPr lang="en-US" sz="2000" b="1" dirty="0" smtClean="0"/>
+              <a:t>Links to Download:</a:t>
+            </a:r>
+            <a:endParaRPr lang="en-US" sz="2000" b="1" dirty="0" smtClean="0"/>
+          </a:p>
+          <a:p>
+            <a:endParaRPr lang="en-US" sz="2000" dirty="0" smtClean="0"/>
+          </a:p>
+          <a:p>
+            <a:pPr marL="285750" indent="-285750">
+              <a:buFont typeface="Arial" panose="020B0604020202020204" pitchFamily="34" charset="0"/>
+              <a:buChar char="•"/>
+            </a:pPr>
+            <a:r>
+              <a:rPr lang="en-US" dirty="0" smtClean="0"/>
+              <a:t>Anaconda - </a:t>
+            </a:r>
+            <a:r>
+              <a:rPr lang="en-US" u="sng" dirty="0" smtClean="0">
+                <a:hlinkClick r:id="rId2"/>
+              </a:rPr>
+              <a:t>https</a:t>
+            </a:r>
+            <a:r>
+              <a:rPr lang="en-US" u="sng" dirty="0">
+                <a:hlinkClick r:id="rId2"/>
+              </a:rPr>
+              <a:t>://</a:t>
+            </a:r>
+            <a:r>
+              <a:rPr lang="en-US" u="sng" dirty="0" smtClean="0">
+                <a:hlinkClick r:id="rId2"/>
+              </a:rPr>
+              <a:t>repo.anaconda.com/archive/Anaconda3-2022.05-Windows-x86_64.exe</a:t>
+            </a:r>
+            <a:endParaRPr lang="en-US" u="sng" dirty="0" smtClean="0"/>
+          </a:p>
+          <a:p>
+            <a:pPr marL="285750" indent="-285750">
+              <a:buFont typeface="Arial" panose="020B0604020202020204" pitchFamily="34" charset="0"/>
+              <a:buChar char="•"/>
+            </a:pPr>
+            <a:r>
+              <a:rPr lang="en-US" dirty="0" smtClean="0"/>
+              <a:t>Visual studio code- </a:t>
+            </a:r>
+            <a:r>
+              <a:rPr lang="en-US" dirty="0" smtClean="0">
+                <a:hlinkClick r:id="rId3"/>
+              </a:rPr>
+              <a:t>https</a:t>
+            </a:r>
+            <a:r>
+              <a:rPr lang="en-US" dirty="0">
+                <a:hlinkClick r:id="rId3"/>
+              </a:rPr>
+              <a:t>://</a:t>
+            </a:r>
+            <a:r>
+              <a:rPr lang="en-US" dirty="0" smtClean="0">
+                <a:hlinkClick r:id="rId3"/>
+              </a:rPr>
+              <a:t>code.visualstudio.com/sha/download?build=stable&amp;os=win32-x64-user</a:t>
+            </a:r>
+            <a:endParaRPr lang="en-US" dirty="0" smtClean="0"/>
+          </a:p>
+          <a:p>
+            <a:pPr marL="285750" indent="-285750">
+              <a:buFont typeface="Arial" panose="020B0604020202020204" pitchFamily="34" charset="0"/>
+              <a:buChar char="•"/>
+            </a:pPr>
+            <a:endParaRPr lang="en-US" dirty="0"/>
+          </a:p>
+          <a:p>
+            <a:r>
+              <a:rPr lang="en-US" b="1" dirty="0" smtClean="0"/>
+              <a:t>Steps to create environment:</a:t>
+            </a:r>
+            <a:endParaRPr lang="en-US" dirty="0" smtClean="0"/>
+          </a:p>
+          <a:p>
+            <a:pPr marL="342900" indent="-342900">
+              <a:buFont typeface="+mj-lt"/>
+              <a:buAutoNum type="arabicPeriod"/>
+            </a:pPr>
+            <a:r>
+              <a:rPr lang="en-US" dirty="0"/>
+              <a:t>o</a:t>
+            </a:r>
+            <a:r>
+              <a:rPr lang="en-US" dirty="0" smtClean="0"/>
+              <a:t>pen anaconda prompt</a:t>
+            </a:r>
+          </a:p>
+          <a:p>
+            <a:pPr marL="342900" indent="-342900">
+              <a:buFont typeface="+mj-lt"/>
+              <a:buAutoNum type="arabicPeriod"/>
+            </a:pPr>
+            <a:r>
+              <a:rPr lang="en-US" dirty="0" err="1"/>
+              <a:t>conda</a:t>
+            </a:r>
+            <a:r>
+              <a:rPr lang="en-US" dirty="0"/>
+              <a:t> create -n </a:t>
+            </a:r>
+            <a:r>
+              <a:rPr lang="en-US" dirty="0" err="1" smtClean="0"/>
+              <a:t>proj_name</a:t>
+            </a:r>
+            <a:endParaRPr lang="en-US" dirty="0" smtClean="0"/>
+          </a:p>
+          <a:p>
+            <a:pPr marL="342900" indent="-342900">
+              <a:buFont typeface="+mj-lt"/>
+              <a:buAutoNum type="arabicPeriod"/>
+            </a:pPr>
+            <a:r>
+              <a:rPr lang="en-US" dirty="0" err="1"/>
+              <a:t>conda</a:t>
+            </a:r>
+            <a:r>
+              <a:rPr lang="en-US" dirty="0"/>
+              <a:t> activate </a:t>
+            </a:r>
+            <a:r>
+              <a:rPr lang="en-US" dirty="0" err="1" smtClean="0"/>
+              <a:t>proj_name</a:t>
+            </a:r>
+            <a:endParaRPr lang="en-US" dirty="0" smtClean="0"/>
+          </a:p>
+          <a:p>
+            <a:r>
+              <a:rPr lang="en-US" dirty="0" err="1" smtClean="0"/>
+              <a:t>Everytime</a:t>
+            </a:r>
+            <a:r>
+              <a:rPr lang="en-US" dirty="0" smtClean="0"/>
+              <a:t> when we start running the code, please use </a:t>
+            </a:r>
+            <a:r>
+              <a:rPr lang="en-US" b="1" dirty="0" smtClean="0"/>
+              <a:t>step 3</a:t>
+            </a:r>
+          </a:p>
+          <a:p>
+            <a:endParaRPr lang="en-US" dirty="0"/>
+          </a:p>
+          <a:p>
+            <a:r>
+              <a:rPr lang="en-US" b="1" dirty="0" smtClean="0"/>
+              <a:t>Commands to install libraries:</a:t>
+            </a:r>
+            <a:endParaRPr lang="en-US" dirty="0" smtClean="0"/>
+          </a:p>
+          <a:p>
+            <a:pPr marL="285750" indent="-285750">
+              <a:buFont typeface="Arial" panose="020B0604020202020204" pitchFamily="34" charset="0"/>
+              <a:buChar char="•"/>
+            </a:pPr>
+            <a:r>
+              <a:rPr lang="en-US" dirty="0"/>
+              <a:t>p</a:t>
+            </a:r>
+            <a:r>
+              <a:rPr lang="en-US" dirty="0" smtClean="0"/>
+              <a:t>ip install </a:t>
+            </a:r>
+            <a:r>
+              <a:rPr lang="en-US" dirty="0" err="1" smtClean="0"/>
+              <a:t>tensorflow</a:t>
+            </a:r>
+            <a:r>
+              <a:rPr lang="en-US" dirty="0" smtClean="0"/>
+              <a:t> / </a:t>
+            </a:r>
+            <a:r>
+              <a:rPr lang="en-US" dirty="0" err="1"/>
+              <a:t>conda</a:t>
+            </a:r>
+            <a:r>
+              <a:rPr lang="en-US" dirty="0"/>
+              <a:t> install -c </a:t>
+            </a:r>
+            <a:r>
+              <a:rPr lang="en-US" dirty="0" err="1"/>
+              <a:t>conda</a:t>
+            </a:r>
+            <a:r>
+              <a:rPr lang="en-US" dirty="0"/>
+              <a:t>-forge </a:t>
+            </a:r>
+            <a:r>
+              <a:rPr lang="en-US" dirty="0" err="1"/>
+              <a:t>tensorflow</a:t>
+            </a:r>
+            <a:endParaRPr lang="en-US" dirty="0" smtClean="0"/>
+          </a:p>
+          <a:p>
+            <a:pPr marL="285750" indent="-285750">
+              <a:buFont typeface="Arial" panose="020B0604020202020204" pitchFamily="34" charset="0"/>
+              <a:buChar char="•"/>
+            </a:pPr>
+            <a:r>
+              <a:rPr lang="en-US" dirty="0"/>
+              <a:t>pip install </a:t>
+            </a:r>
+            <a:r>
+              <a:rPr lang="en-US" dirty="0" err="1" smtClean="0"/>
+              <a:t>keras</a:t>
+            </a:r>
+            <a:r>
+              <a:rPr lang="en-US" dirty="0" smtClean="0"/>
+              <a:t> / </a:t>
+            </a:r>
+            <a:r>
+              <a:rPr lang="en-US" dirty="0" err="1"/>
+              <a:t>conda</a:t>
+            </a:r>
+            <a:r>
+              <a:rPr lang="en-US" dirty="0"/>
+              <a:t> install -c </a:t>
+            </a:r>
+            <a:r>
+              <a:rPr lang="en-US" dirty="0" err="1"/>
+              <a:t>conda</a:t>
+            </a:r>
+            <a:r>
+              <a:rPr lang="en-US" dirty="0"/>
+              <a:t>-forge </a:t>
+            </a:r>
+            <a:r>
+              <a:rPr lang="en-US" dirty="0" err="1"/>
+              <a:t>keras</a:t>
+            </a:r>
+            <a:endParaRPr lang="en-US" dirty="0" smtClean="0"/>
+          </a:p>
+          <a:p>
+            <a:pPr marL="285750" indent="-285750">
+              <a:buFont typeface="Arial" panose="020B0604020202020204" pitchFamily="34" charset="0"/>
+              <a:buChar char="•"/>
+            </a:pPr>
+            <a:r>
+              <a:rPr lang="en-US" dirty="0"/>
+              <a:t>pip </a:t>
+            </a:r>
+            <a:r>
+              <a:rPr lang="en-US" dirty="0" smtClean="0"/>
+              <a:t>install </a:t>
+            </a:r>
+            <a:r>
+              <a:rPr lang="en-US" dirty="0" err="1" smtClean="0"/>
+              <a:t>scikit</a:t>
+            </a:r>
+            <a:r>
+              <a:rPr lang="en-US" dirty="0" smtClean="0"/>
+              <a:t>-image / </a:t>
+            </a:r>
+            <a:r>
+              <a:rPr lang="en-US" dirty="0" err="1"/>
+              <a:t>conda</a:t>
+            </a:r>
+            <a:r>
+              <a:rPr lang="en-US" dirty="0"/>
+              <a:t> install -c anaconda </a:t>
+            </a:r>
+            <a:r>
+              <a:rPr lang="en-US" dirty="0" err="1"/>
+              <a:t>scikit</a:t>
+            </a:r>
+            <a:r>
+              <a:rPr lang="en-US" dirty="0"/>
+              <a:t>-image</a:t>
+            </a:r>
+            <a:endParaRPr lang="en-US" dirty="0"/>
+          </a:p>
+          <a:p>
+            <a:pPr marL="285750" indent="-285750">
+              <a:buFont typeface="Arial" panose="020B0604020202020204" pitchFamily="34" charset="0"/>
+              <a:buChar char="•"/>
+            </a:pPr>
+            <a:r>
+              <a:rPr lang="en-US" dirty="0"/>
+              <a:t>pip install </a:t>
+            </a:r>
+            <a:r>
+              <a:rPr lang="en-US" dirty="0" err="1" smtClean="0"/>
+              <a:t>opencv</a:t>
+            </a:r>
+            <a:r>
+              <a:rPr lang="en-US" dirty="0" smtClean="0"/>
+              <a:t>-python / </a:t>
+            </a:r>
+            <a:r>
+              <a:rPr lang="en-US" dirty="0" err="1" smtClean="0"/>
+              <a:t>conda</a:t>
+            </a:r>
+            <a:r>
+              <a:rPr lang="en-US" dirty="0" smtClean="0"/>
+              <a:t> install </a:t>
+            </a:r>
+            <a:r>
+              <a:rPr lang="en-US" dirty="0"/>
+              <a:t>-c </a:t>
+            </a:r>
+            <a:r>
+              <a:rPr lang="en-US" dirty="0" err="1"/>
+              <a:t>conda</a:t>
+            </a:r>
+            <a:r>
+              <a:rPr lang="en-US" dirty="0"/>
+              <a:t>-forge </a:t>
+            </a:r>
+            <a:r>
+              <a:rPr lang="en-US" dirty="0" err="1" smtClean="0"/>
+              <a:t>opencv</a:t>
+            </a:r>
+            <a:endParaRPr lang="en-US" dirty="0" smtClean="0"/>
+          </a:p>
+          <a:p>
+            <a:pPr marL="285750" indent="-285750">
+              <a:buFont typeface="Arial" panose="020B0604020202020204" pitchFamily="34" charset="0"/>
+              <a:buChar char="•"/>
+            </a:pPr>
+            <a:r>
+              <a:rPr lang="en-US" dirty="0"/>
+              <a:t>pip install </a:t>
+            </a:r>
+            <a:r>
+              <a:rPr lang="en-US" dirty="0" err="1" smtClean="0"/>
+              <a:t>seaborn</a:t>
+            </a:r>
+            <a:r>
+              <a:rPr lang="en-US" dirty="0" smtClean="0"/>
+              <a:t> / </a:t>
+            </a:r>
+            <a:r>
+              <a:rPr lang="en-US" dirty="0" err="1"/>
+              <a:t>conda</a:t>
+            </a:r>
+            <a:r>
+              <a:rPr lang="en-US" dirty="0"/>
+              <a:t> install -c anaconda </a:t>
+            </a:r>
+            <a:r>
+              <a:rPr lang="en-US" dirty="0" err="1" smtClean="0"/>
+              <a:t>seaborn</a:t>
+            </a:r>
+            <a:endParaRPr lang="en-US" dirty="0" smtClean="0"/>
+          </a:p>
+          <a:p>
+            <a:pPr marL="285750" indent="-285750">
+              <a:buFont typeface="Arial" panose="020B0604020202020204" pitchFamily="34" charset="0"/>
+              <a:buChar char="•"/>
+            </a:pPr>
+            <a:r>
+              <a:rPr lang="en-US" dirty="0"/>
+              <a:t>pip install </a:t>
+            </a:r>
+            <a:r>
+              <a:rPr lang="en-US" dirty="0" err="1" smtClean="0"/>
+              <a:t>scikit</a:t>
+            </a:r>
+            <a:r>
+              <a:rPr lang="en-US" dirty="0" smtClean="0"/>
+              <a:t>-learn / </a:t>
+            </a:r>
+            <a:r>
+              <a:rPr lang="en-US" dirty="0" err="1" smtClean="0"/>
+              <a:t>conda</a:t>
+            </a:r>
+            <a:r>
+              <a:rPr lang="en-US" dirty="0" smtClean="0"/>
+              <a:t> </a:t>
+            </a:r>
+            <a:r>
+              <a:rPr lang="en-US" dirty="0"/>
+              <a:t>install -c anaconda </a:t>
+            </a:r>
+            <a:r>
+              <a:rPr lang="en-US" dirty="0" err="1"/>
+              <a:t>scikit</a:t>
+            </a:r>
+            <a:r>
+              <a:rPr lang="en-US" dirty="0"/>
+              <a:t>-learn</a:t>
+            </a:r>
+            <a:endParaRPr lang="en-US" dirty="0"/>
+          </a:p>
+        </p:txBody>
+      </p:sp>
+      <p:pic>
+        <p:nvPicPr>
+          <p:cNvPr id="6" name="Picture 5"/>
+          <p:cNvPicPr>
+            <a:picLocks noChangeAspect="1"/>
+          </p:cNvPicPr>
+          <p:nvPr/>
+        </p:nvPicPr>
+        <p:blipFill>
+          <a:blip r:embed="rId4"/>
+          <a:stretch>
+            <a:fillRect/>
+          </a:stretch>
+        </p:blipFill>
+        <p:spPr>
+          <a:xfrm>
+            <a:off x="6220048" y="1948255"/>
+            <a:ext cx="4606448" cy="1027885"/>
+          </a:xfrm>
+          <a:prstGeom prst="rect">
+            <a:avLst/>
+          </a:prstGeom>
+        </p:spPr>
+      </p:pic>
+      <p:grpSp>
+        <p:nvGrpSpPr>
+          <p:cNvPr id="11" name="Group 10"/>
+          <p:cNvGrpSpPr/>
+          <p:nvPr/>
+        </p:nvGrpSpPr>
+        <p:grpSpPr>
+          <a:xfrm>
+            <a:off x="8266176" y="3701613"/>
+            <a:ext cx="3374136" cy="2527716"/>
+            <a:chOff x="8586191" y="3711352"/>
+            <a:chExt cx="2651760" cy="2002536"/>
+          </a:xfrm>
+        </p:grpSpPr>
+        <p:grpSp>
+          <p:nvGrpSpPr>
+            <p:cNvPr id="9" name="Group 8"/>
+            <p:cNvGrpSpPr/>
+            <p:nvPr/>
+          </p:nvGrpSpPr>
+          <p:grpSpPr>
+            <a:xfrm>
+              <a:off x="8586191" y="3711352"/>
+              <a:ext cx="2651760" cy="2002536"/>
+              <a:chOff x="8951951" y="2595784"/>
+              <a:chExt cx="2651760" cy="2002536"/>
+            </a:xfrm>
+          </p:grpSpPr>
+          <p:sp>
+            <p:nvSpPr>
+              <p:cNvPr id="8" name="Rectangle 7"/>
+              <p:cNvSpPr/>
+              <p:nvPr/>
+            </p:nvSpPr>
+            <p:spPr>
+              <a:xfrm>
+                <a:off x="8951951" y="2595784"/>
+                <a:ext cx="2651760" cy="2002536"/>
+              </a:xfrm>
+              <a:prstGeom prst="rect">
+                <a:avLst/>
+              </a:prstGeom>
+            </p:spPr>
+            <p:style>
+              <a:lnRef idx="0">
+                <a:schemeClr val="accent6"/>
+              </a:lnRef>
+              <a:fillRef idx="3">
+                <a:schemeClr val="accent6"/>
+              </a:fillRef>
+              <a:effectRef idx="3">
+                <a:schemeClr val="accent6"/>
+              </a:effectRef>
+              <a:fontRef idx="minor">
+                <a:schemeClr val="lt1"/>
+              </a:fontRef>
+            </p:style>
+            <p:txBody>
+              <a:bodyPr rtlCol="0" anchor="ctr"/>
+              <a:lstStyle/>
+              <a:p>
+                <a:pPr algn="ctr"/>
+                <a:endParaRPr lang="en-US" dirty="0"/>
+              </a:p>
+            </p:txBody>
+          </p:sp>
+          <p:pic>
+            <p:nvPicPr>
+              <p:cNvPr id="7" name="Picture 6"/>
+              <p:cNvPicPr>
+                <a:picLocks noChangeAspect="1"/>
+              </p:cNvPicPr>
+              <p:nvPr/>
+            </p:nvPicPr>
+            <p:blipFill rotWithShape="1">
+              <a:blip r:embed="rId5"/>
+              <a:srcRect r="72003"/>
+              <a:stretch/>
+            </p:blipFill>
+            <p:spPr>
+              <a:xfrm>
+                <a:off x="9175319" y="3375516"/>
+                <a:ext cx="1576221" cy="743054"/>
+              </a:xfrm>
+              <a:prstGeom prst="rect">
+                <a:avLst/>
+              </a:prstGeom>
+            </p:spPr>
+          </p:pic>
+        </p:grpSp>
+        <p:sp>
+          <p:nvSpPr>
+            <p:cNvPr id="10" name="Rectangle 9"/>
+            <p:cNvSpPr/>
+            <p:nvPr/>
+          </p:nvSpPr>
+          <p:spPr>
+            <a:xfrm>
+              <a:off x="8700548" y="3845196"/>
+              <a:ext cx="1437893" cy="512044"/>
+            </a:xfrm>
+            <a:prstGeom prst="rect">
+              <a:avLst/>
+            </a:prstGeom>
+          </p:spPr>
+          <p:txBody>
+            <a:bodyPr wrap="square">
+              <a:spAutoFit/>
+            </a:bodyPr>
+            <a:lstStyle/>
+            <a:p>
+              <a:r>
+                <a:rPr lang="en-US" dirty="0"/>
+                <a:t>Please follow the </a:t>
+              </a:r>
+              <a:r>
+                <a:rPr lang="en-US" dirty="0" smtClean="0"/>
+                <a:t>folder </a:t>
+              </a:r>
+              <a:r>
+                <a:rPr lang="en-US" dirty="0"/>
+                <a:t>structure</a:t>
+              </a:r>
+              <a:endParaRPr lang="en-US" dirty="0"/>
+            </a:p>
+          </p:txBody>
+        </p:sp>
+      </p:grpSp>
+    </p:spTree>
+    <p:extLst>
+      <p:ext uri="{BB962C8B-B14F-4D97-AF65-F5344CB8AC3E}">
+        <p14:creationId xmlns:p14="http://schemas.microsoft.com/office/powerpoint/2010/main" val="3043219982"/>
       </p:ext>
     </p:extLst>
   </p:cSld>

</xml_diff>

<commit_message>
Block Diagram has been updated -> Project_Presentation.pptx
</commit_message>
<xml_diff>
--- a/Documents/Study/Project_Presentation.pptx
+++ b/Documents/Study/Project_Presentation.pptx
@@ -8,11 +8,12 @@
     <p:sldId id="256" r:id="rId2"/>
     <p:sldId id="257" r:id="rId3"/>
     <p:sldId id="262" r:id="rId4"/>
-    <p:sldId id="258" r:id="rId5"/>
-    <p:sldId id="259" r:id="rId6"/>
-    <p:sldId id="260" r:id="rId7"/>
-    <p:sldId id="261" r:id="rId8"/>
-    <p:sldId id="263" r:id="rId9"/>
+    <p:sldId id="264" r:id="rId5"/>
+    <p:sldId id="258" r:id="rId6"/>
+    <p:sldId id="259" r:id="rId7"/>
+    <p:sldId id="260" r:id="rId8"/>
+    <p:sldId id="261" r:id="rId9"/>
+    <p:sldId id="263" r:id="rId10"/>
   </p:sldIdLst>
   <p:sldSz cx="12192000" cy="6858000"/>
   <p:notesSz cx="6858000" cy="9144000"/>
@@ -250,7 +251,7 @@
           <a:p>
             <a:fld id="{75507C98-8ED6-4F4D-BBFA-74E792F1F6FB}" type="datetimeFigureOut">
               <a:rPr lang="en-US" smtClean="0"/>
-              <a:t>6/7/2022</a:t>
+              <a:t>6/21/2022</a:t>
             </a:fld>
             <a:endParaRPr lang="en-US"/>
           </a:p>
@@ -420,7 +421,7 @@
           <a:p>
             <a:fld id="{75507C98-8ED6-4F4D-BBFA-74E792F1F6FB}" type="datetimeFigureOut">
               <a:rPr lang="en-US" smtClean="0"/>
-              <a:t>6/7/2022</a:t>
+              <a:t>6/21/2022</a:t>
             </a:fld>
             <a:endParaRPr lang="en-US"/>
           </a:p>
@@ -600,7 +601,7 @@
           <a:p>
             <a:fld id="{75507C98-8ED6-4F4D-BBFA-74E792F1F6FB}" type="datetimeFigureOut">
               <a:rPr lang="en-US" smtClean="0"/>
-              <a:t>6/7/2022</a:t>
+              <a:t>6/21/2022</a:t>
             </a:fld>
             <a:endParaRPr lang="en-US"/>
           </a:p>
@@ -770,7 +771,7 @@
           <a:p>
             <a:fld id="{75507C98-8ED6-4F4D-BBFA-74E792F1F6FB}" type="datetimeFigureOut">
               <a:rPr lang="en-US" smtClean="0"/>
-              <a:t>6/7/2022</a:t>
+              <a:t>6/21/2022</a:t>
             </a:fld>
             <a:endParaRPr lang="en-US"/>
           </a:p>
@@ -1016,7 +1017,7 @@
           <a:p>
             <a:fld id="{75507C98-8ED6-4F4D-BBFA-74E792F1F6FB}" type="datetimeFigureOut">
               <a:rPr lang="en-US" smtClean="0"/>
-              <a:t>6/7/2022</a:t>
+              <a:t>6/21/2022</a:t>
             </a:fld>
             <a:endParaRPr lang="en-US"/>
           </a:p>
@@ -1248,7 +1249,7 @@
           <a:p>
             <a:fld id="{75507C98-8ED6-4F4D-BBFA-74E792F1F6FB}" type="datetimeFigureOut">
               <a:rPr lang="en-US" smtClean="0"/>
-              <a:t>6/7/2022</a:t>
+              <a:t>6/21/2022</a:t>
             </a:fld>
             <a:endParaRPr lang="en-US"/>
           </a:p>
@@ -1615,7 +1616,7 @@
           <a:p>
             <a:fld id="{75507C98-8ED6-4F4D-BBFA-74E792F1F6FB}" type="datetimeFigureOut">
               <a:rPr lang="en-US" smtClean="0"/>
-              <a:t>6/7/2022</a:t>
+              <a:t>6/21/2022</a:t>
             </a:fld>
             <a:endParaRPr lang="en-US"/>
           </a:p>
@@ -1733,7 +1734,7 @@
           <a:p>
             <a:fld id="{75507C98-8ED6-4F4D-BBFA-74E792F1F6FB}" type="datetimeFigureOut">
               <a:rPr lang="en-US" smtClean="0"/>
-              <a:t>6/7/2022</a:t>
+              <a:t>6/21/2022</a:t>
             </a:fld>
             <a:endParaRPr lang="en-US"/>
           </a:p>
@@ -1828,7 +1829,7 @@
           <a:p>
             <a:fld id="{75507C98-8ED6-4F4D-BBFA-74E792F1F6FB}" type="datetimeFigureOut">
               <a:rPr lang="en-US" smtClean="0"/>
-              <a:t>6/7/2022</a:t>
+              <a:t>6/21/2022</a:t>
             </a:fld>
             <a:endParaRPr lang="en-US"/>
           </a:p>
@@ -2105,7 +2106,7 @@
           <a:p>
             <a:fld id="{75507C98-8ED6-4F4D-BBFA-74E792F1F6FB}" type="datetimeFigureOut">
               <a:rPr lang="en-US" smtClean="0"/>
-              <a:t>6/7/2022</a:t>
+              <a:t>6/21/2022</a:t>
             </a:fld>
             <a:endParaRPr lang="en-US"/>
           </a:p>
@@ -2358,7 +2359,7 @@
           <a:p>
             <a:fld id="{75507C98-8ED6-4F4D-BBFA-74E792F1F6FB}" type="datetimeFigureOut">
               <a:rPr lang="en-US" smtClean="0"/>
-              <a:t>6/7/2022</a:t>
+              <a:t>6/21/2022</a:t>
             </a:fld>
             <a:endParaRPr lang="en-US"/>
           </a:p>
@@ -2571,7 +2572,7 @@
           <a:p>
             <a:fld id="{75507C98-8ED6-4F4D-BBFA-74E792F1F6FB}" type="datetimeFigureOut">
               <a:rPr lang="en-US" smtClean="0"/>
-              <a:t>6/7/2022</a:t>
+              <a:t>6/21/2022</a:t>
             </a:fld>
             <a:endParaRPr lang="en-US"/>
           </a:p>
@@ -3009,7 +3010,7 @@
           <p:cNvPr id="4" name="Picture 3">
             <a:extLst>
               <a:ext uri="{FF2B5EF4-FFF2-40B4-BE49-F238E27FC236}">
-                <a16:creationId xmlns="" xmlns:a16="http://schemas.microsoft.com/office/drawing/2014/main" id="{4F123114-E0DF-4542-9867-FE12447B6DCE}"/>
+                <a16:creationId xmlns:a16="http://schemas.microsoft.com/office/drawing/2014/main" xmlns="" id="{4F123114-E0DF-4542-9867-FE12447B6DCE}"/>
               </a:ext>
             </a:extLst>
           </p:cNvPr>
@@ -3178,7 +3179,7 @@
           <p:cNvPr id="5" name="Picture 4">
             <a:extLst>
               <a:ext uri="{FF2B5EF4-FFF2-40B4-BE49-F238E27FC236}">
-                <a16:creationId xmlns="" xmlns:a16="http://schemas.microsoft.com/office/drawing/2014/main" id="{4F123114-E0DF-4542-9867-FE12447B6DCE}"/>
+                <a16:creationId xmlns:a16="http://schemas.microsoft.com/office/drawing/2014/main" xmlns="" id="{4F123114-E0DF-4542-9867-FE12447B6DCE}"/>
               </a:ext>
             </a:extLst>
           </p:cNvPr>
@@ -3263,8 +3264,13 @@
           <a:p>
             <a:r>
               <a:rPr lang="en-US" sz="2000" b="1" dirty="0" smtClean="0"/>
-              <a:t>Block Diagram:</a:t>
-            </a:r>
+              <a:t>Block </a:t>
+            </a:r>
+            <a:r>
+              <a:rPr lang="en-US" sz="2000" b="1" dirty="0" smtClean="0"/>
+              <a:t>Diagram:</a:t>
+            </a:r>
+            <a:endParaRPr lang="en-US" sz="2000" b="1" dirty="0" smtClean="0"/>
           </a:p>
         </p:txBody>
       </p:sp>
@@ -3273,7 +3279,7 @@
           <p:cNvPr id="5" name="Picture 4">
             <a:extLst>
               <a:ext uri="{FF2B5EF4-FFF2-40B4-BE49-F238E27FC236}">
-                <a16:creationId xmlns="" xmlns:a16="http://schemas.microsoft.com/office/drawing/2014/main" id="{4F123114-E0DF-4542-9867-FE12447B6DCE}"/>
+                <a16:creationId xmlns:a16="http://schemas.microsoft.com/office/drawing/2014/main" xmlns="" id="{4F123114-E0DF-4542-9867-FE12447B6DCE}"/>
               </a:ext>
             </a:extLst>
           </p:cNvPr>
@@ -4433,6 +4439,1076 @@
           <a:chExt cx="0" cy="0"/>
         </a:xfrm>
       </p:grpSpPr>
+      <p:pic>
+        <p:nvPicPr>
+          <p:cNvPr id="5" name="Picture 4">
+            <a:extLst>
+              <a:ext uri="{FF2B5EF4-FFF2-40B4-BE49-F238E27FC236}">
+                <a16:creationId xmlns:a16="http://schemas.microsoft.com/office/drawing/2014/main" xmlns="" id="{4F123114-E0DF-4542-9867-FE12447B6DCE}"/>
+              </a:ext>
+            </a:extLst>
+          </p:cNvPr>
+          <p:cNvPicPr>
+            <a:picLocks noChangeAspect="1"/>
+          </p:cNvPicPr>
+          <p:nvPr/>
+        </p:nvPicPr>
+        <p:blipFill>
+          <a:blip r:embed="rId2" cstate="print">
+            <a:extLst>
+              <a:ext uri="{28A0092B-C50C-407E-A947-70E740481C1C}">
+                <a14:useLocalDpi xmlns:a14="http://schemas.microsoft.com/office/drawing/2010/main" val="0"/>
+              </a:ext>
+            </a:extLst>
+          </a:blip>
+          <a:stretch>
+            <a:fillRect/>
+          </a:stretch>
+        </p:blipFill>
+        <p:spPr>
+          <a:xfrm>
+            <a:off x="11199939" y="141722"/>
+            <a:ext cx="831672" cy="831672"/>
+          </a:xfrm>
+          <a:prstGeom prst="rect">
+            <a:avLst/>
+          </a:prstGeom>
+        </p:spPr>
+      </p:pic>
+      <p:grpSp>
+        <p:nvGrpSpPr>
+          <p:cNvPr id="135" name="Group 134"/>
+          <p:cNvGrpSpPr/>
+          <p:nvPr/>
+        </p:nvGrpSpPr>
+        <p:grpSpPr>
+          <a:xfrm>
+            <a:off x="137160" y="210810"/>
+            <a:ext cx="10479266" cy="6206500"/>
+            <a:chOff x="137160" y="210810"/>
+            <a:chExt cx="10479266" cy="6206500"/>
+          </a:xfrm>
+        </p:grpSpPr>
+        <p:sp>
+          <p:nvSpPr>
+            <p:cNvPr id="4" name="TextBox 3"/>
+            <p:cNvSpPr txBox="1"/>
+            <p:nvPr/>
+          </p:nvSpPr>
+          <p:spPr>
+            <a:xfrm>
+              <a:off x="137160" y="210810"/>
+              <a:ext cx="7680960" cy="400110"/>
+            </a:xfrm>
+            <a:prstGeom prst="rect">
+              <a:avLst/>
+            </a:prstGeom>
+            <a:noFill/>
+          </p:spPr>
+          <p:txBody>
+            <a:bodyPr wrap="square" rtlCol="0">
+              <a:spAutoFit/>
+            </a:bodyPr>
+            <a:lstStyle/>
+            <a:p>
+              <a:r>
+                <a:rPr lang="en-US" sz="2000" b="1" dirty="0" smtClean="0"/>
+                <a:t>Block Diagram:</a:t>
+              </a:r>
+            </a:p>
+          </p:txBody>
+        </p:sp>
+        <p:sp>
+          <p:nvSpPr>
+            <p:cNvPr id="7" name="Rectangle 6"/>
+            <p:cNvSpPr/>
+            <p:nvPr/>
+          </p:nvSpPr>
+          <p:spPr>
+            <a:xfrm>
+              <a:off x="2257275" y="3462167"/>
+              <a:ext cx="1988946" cy="989822"/>
+            </a:xfrm>
+            <a:prstGeom prst="rect">
+              <a:avLst/>
+            </a:prstGeom>
+            <a:noFill/>
+          </p:spPr>
+          <p:style>
+            <a:lnRef idx="2">
+              <a:schemeClr val="accent1">
+                <a:shade val="50000"/>
+              </a:schemeClr>
+            </a:lnRef>
+            <a:fillRef idx="1">
+              <a:schemeClr val="accent1"/>
+            </a:fillRef>
+            <a:effectRef idx="0">
+              <a:schemeClr val="accent1"/>
+            </a:effectRef>
+            <a:fontRef idx="minor">
+              <a:schemeClr val="lt1"/>
+            </a:fontRef>
+          </p:style>
+          <p:txBody>
+            <a:bodyPr rtlCol="0" anchor="ctr"/>
+            <a:lstStyle/>
+            <a:p>
+              <a:pPr algn="ctr"/>
+              <a:r>
+                <a:rPr lang="en-US" sz="1600" dirty="0" smtClean="0">
+                  <a:solidFill>
+                    <a:schemeClr val="tx1"/>
+                  </a:solidFill>
+                </a:rPr>
+                <a:t>Preprocessing ground-truth images and annotations</a:t>
+              </a:r>
+              <a:endParaRPr lang="en-US" sz="1600" dirty="0">
+                <a:solidFill>
+                  <a:schemeClr val="tx1"/>
+                </a:solidFill>
+              </a:endParaRPr>
+            </a:p>
+          </p:txBody>
+        </p:sp>
+        <p:sp>
+          <p:nvSpPr>
+            <p:cNvPr id="25" name="Rectangle 24"/>
+            <p:cNvSpPr/>
+            <p:nvPr/>
+          </p:nvSpPr>
+          <p:spPr>
+            <a:xfrm>
+              <a:off x="5140919" y="1677597"/>
+              <a:ext cx="2540684" cy="975658"/>
+            </a:xfrm>
+            <a:prstGeom prst="rect">
+              <a:avLst/>
+            </a:prstGeom>
+            <a:noFill/>
+          </p:spPr>
+          <p:style>
+            <a:lnRef idx="2">
+              <a:schemeClr val="accent1">
+                <a:shade val="50000"/>
+              </a:schemeClr>
+            </a:lnRef>
+            <a:fillRef idx="1">
+              <a:schemeClr val="accent1"/>
+            </a:fillRef>
+            <a:effectRef idx="0">
+              <a:schemeClr val="accent1"/>
+            </a:effectRef>
+            <a:fontRef idx="minor">
+              <a:schemeClr val="lt1"/>
+            </a:fontRef>
+          </p:style>
+          <p:txBody>
+            <a:bodyPr rtlCol="0" anchor="ctr"/>
+            <a:lstStyle/>
+            <a:p>
+              <a:pPr algn="ctr"/>
+              <a:r>
+                <a:rPr lang="en-US" sz="1600" dirty="0" smtClean="0">
+                  <a:solidFill>
+                    <a:schemeClr val="tx1"/>
+                  </a:solidFill>
+                </a:rPr>
+                <a:t>Detecting Texts in natural </a:t>
+              </a:r>
+              <a:r>
+                <a:rPr lang="en-US" sz="1600" dirty="0">
+                  <a:solidFill>
+                    <a:schemeClr val="tx1"/>
+                  </a:solidFill>
+                </a:rPr>
+                <a:t>scene images </a:t>
+              </a:r>
+              <a:endParaRPr lang="en-US" sz="1600" dirty="0" smtClean="0">
+                <a:solidFill>
+                  <a:schemeClr val="tx1"/>
+                </a:solidFill>
+              </a:endParaRPr>
+            </a:p>
+            <a:p>
+              <a:pPr algn="ctr"/>
+              <a:r>
+                <a:rPr lang="en-US" sz="1600" dirty="0" smtClean="0">
+                  <a:solidFill>
+                    <a:schemeClr val="tx1"/>
+                  </a:solidFill>
+                </a:rPr>
+                <a:t>(</a:t>
+              </a:r>
+              <a:r>
+                <a:rPr lang="en-US" sz="1600" dirty="0">
+                  <a:solidFill>
+                    <a:schemeClr val="tx1"/>
+                  </a:solidFill>
+                </a:rPr>
+                <a:t>using </a:t>
+              </a:r>
+              <a:r>
+                <a:rPr lang="en-US" sz="1600" dirty="0" smtClean="0">
+                  <a:solidFill>
+                    <a:schemeClr val="tx1"/>
+                  </a:solidFill>
+                </a:rPr>
+                <a:t>CNN Technique)</a:t>
+              </a:r>
+              <a:endParaRPr lang="en-US" sz="1600" dirty="0">
+                <a:solidFill>
+                  <a:schemeClr val="tx1"/>
+                </a:solidFill>
+              </a:endParaRPr>
+            </a:p>
+          </p:txBody>
+        </p:sp>
+        <p:cxnSp>
+          <p:nvCxnSpPr>
+            <p:cNvPr id="44" name="Straight Connector 43"/>
+            <p:cNvCxnSpPr>
+              <a:endCxn id="7" idx="3"/>
+            </p:cNvCxnSpPr>
+            <p:nvPr/>
+          </p:nvCxnSpPr>
+          <p:spPr>
+            <a:xfrm flipH="1">
+              <a:off x="4246221" y="3957078"/>
+              <a:ext cx="482145" cy="0"/>
+            </a:xfrm>
+            <a:prstGeom prst="line">
+              <a:avLst/>
+            </a:prstGeom>
+            <a:ln>
+              <a:solidFill>
+                <a:schemeClr val="tx1"/>
+              </a:solidFill>
+              <a:prstDash val="dash"/>
+            </a:ln>
+          </p:spPr>
+          <p:style>
+            <a:lnRef idx="1">
+              <a:schemeClr val="accent1"/>
+            </a:lnRef>
+            <a:fillRef idx="0">
+              <a:schemeClr val="accent1"/>
+            </a:fillRef>
+            <a:effectRef idx="0">
+              <a:schemeClr val="accent1"/>
+            </a:effectRef>
+            <a:fontRef idx="minor">
+              <a:schemeClr val="tx1"/>
+            </a:fontRef>
+          </p:style>
+        </p:cxnSp>
+        <p:sp>
+          <p:nvSpPr>
+            <p:cNvPr id="50" name="Rectangle 49"/>
+            <p:cNvSpPr/>
+            <p:nvPr/>
+          </p:nvSpPr>
+          <p:spPr>
+            <a:xfrm>
+              <a:off x="5140919" y="3494589"/>
+              <a:ext cx="2540684" cy="924986"/>
+            </a:xfrm>
+            <a:prstGeom prst="rect">
+              <a:avLst/>
+            </a:prstGeom>
+            <a:noFill/>
+          </p:spPr>
+          <p:style>
+            <a:lnRef idx="2">
+              <a:schemeClr val="accent1">
+                <a:shade val="50000"/>
+              </a:schemeClr>
+            </a:lnRef>
+            <a:fillRef idx="1">
+              <a:schemeClr val="accent1"/>
+            </a:fillRef>
+            <a:effectRef idx="0">
+              <a:schemeClr val="accent1"/>
+            </a:effectRef>
+            <a:fontRef idx="minor">
+              <a:schemeClr val="lt1"/>
+            </a:fontRef>
+          </p:style>
+          <p:txBody>
+            <a:bodyPr rtlCol="0" anchor="ctr"/>
+            <a:lstStyle/>
+            <a:p>
+              <a:pPr algn="ctr"/>
+              <a:r>
+                <a:rPr lang="en-US" sz="1600" dirty="0" smtClean="0">
+                  <a:solidFill>
+                    <a:schemeClr val="tx1"/>
+                  </a:solidFill>
+                </a:rPr>
+                <a:t>Classifying the texts and non-texts</a:t>
+              </a:r>
+            </a:p>
+            <a:p>
+              <a:pPr algn="ctr"/>
+              <a:r>
+                <a:rPr lang="en-US" sz="1600" dirty="0" smtClean="0">
+                  <a:solidFill>
+                    <a:schemeClr val="tx1"/>
+                  </a:solidFill>
+                </a:rPr>
+                <a:t>(using RCNN Technique)</a:t>
+              </a:r>
+              <a:endParaRPr lang="en-US" sz="1600" dirty="0">
+                <a:solidFill>
+                  <a:schemeClr val="tx1"/>
+                </a:solidFill>
+              </a:endParaRPr>
+            </a:p>
+          </p:txBody>
+        </p:sp>
+        <p:sp>
+          <p:nvSpPr>
+            <p:cNvPr id="67" name="Rectangle 66"/>
+            <p:cNvSpPr/>
+            <p:nvPr/>
+          </p:nvSpPr>
+          <p:spPr>
+            <a:xfrm>
+              <a:off x="5140919" y="5290851"/>
+              <a:ext cx="2540684" cy="1126459"/>
+            </a:xfrm>
+            <a:prstGeom prst="rect">
+              <a:avLst/>
+            </a:prstGeom>
+            <a:noFill/>
+          </p:spPr>
+          <p:style>
+            <a:lnRef idx="2">
+              <a:schemeClr val="accent1">
+                <a:shade val="50000"/>
+              </a:schemeClr>
+            </a:lnRef>
+            <a:fillRef idx="1">
+              <a:schemeClr val="accent1"/>
+            </a:fillRef>
+            <a:effectRef idx="0">
+              <a:schemeClr val="accent1"/>
+            </a:effectRef>
+            <a:fontRef idx="minor">
+              <a:schemeClr val="lt1"/>
+            </a:fontRef>
+          </p:style>
+          <p:txBody>
+            <a:bodyPr rtlCol="0" anchor="ctr"/>
+            <a:lstStyle/>
+            <a:p>
+              <a:pPr algn="ctr"/>
+              <a:r>
+                <a:rPr lang="en-US" sz="1600" dirty="0" smtClean="0">
+                  <a:solidFill>
+                    <a:schemeClr val="tx1"/>
+                  </a:solidFill>
+                </a:rPr>
+                <a:t>Recognizing the texts that </a:t>
+              </a:r>
+              <a:r>
+                <a:rPr lang="en-US" sz="1600" dirty="0">
+                  <a:solidFill>
+                    <a:schemeClr val="tx1"/>
+                  </a:solidFill>
+                </a:rPr>
+                <a:t>are </a:t>
+              </a:r>
+              <a:r>
+                <a:rPr lang="en-US" sz="1600" dirty="0" smtClean="0">
+                  <a:solidFill>
+                    <a:schemeClr val="tx1"/>
+                  </a:solidFill>
+                </a:rPr>
+                <a:t>localized</a:t>
+              </a:r>
+            </a:p>
+            <a:p>
+              <a:pPr algn="ctr"/>
+              <a:r>
+                <a:rPr lang="en-US" sz="1600" dirty="0" smtClean="0">
+                  <a:solidFill>
+                    <a:schemeClr val="tx1"/>
+                  </a:solidFill>
+                </a:rPr>
+                <a:t>(using RNN/Sequential Models)</a:t>
+              </a:r>
+              <a:endParaRPr lang="en-US" sz="1600" dirty="0">
+                <a:solidFill>
+                  <a:schemeClr val="tx1"/>
+                </a:solidFill>
+              </a:endParaRPr>
+            </a:p>
+          </p:txBody>
+        </p:sp>
+        <p:cxnSp>
+          <p:nvCxnSpPr>
+            <p:cNvPr id="10" name="Straight Arrow Connector 9"/>
+            <p:cNvCxnSpPr>
+              <a:endCxn id="25" idx="1"/>
+            </p:cNvCxnSpPr>
+            <p:nvPr/>
+          </p:nvCxnSpPr>
+          <p:spPr>
+            <a:xfrm>
+              <a:off x="4728366" y="2159209"/>
+              <a:ext cx="412553" cy="6217"/>
+            </a:xfrm>
+            <a:prstGeom prst="straightConnector1">
+              <a:avLst/>
+            </a:prstGeom>
+            <a:ln>
+              <a:tailEnd type="triangle"/>
+            </a:ln>
+          </p:spPr>
+          <p:style>
+            <a:lnRef idx="1">
+              <a:schemeClr val="accent1"/>
+            </a:lnRef>
+            <a:fillRef idx="0">
+              <a:schemeClr val="accent1"/>
+            </a:fillRef>
+            <a:effectRef idx="0">
+              <a:schemeClr val="accent1"/>
+            </a:effectRef>
+            <a:fontRef idx="minor">
+              <a:schemeClr val="tx1"/>
+            </a:fontRef>
+          </p:style>
+        </p:cxnSp>
+        <p:cxnSp>
+          <p:nvCxnSpPr>
+            <p:cNvPr id="42" name="Straight Connector 41"/>
+            <p:cNvCxnSpPr/>
+            <p:nvPr/>
+          </p:nvCxnSpPr>
+          <p:spPr>
+            <a:xfrm flipH="1">
+              <a:off x="4718548" y="2159212"/>
+              <a:ext cx="9818" cy="3694866"/>
+            </a:xfrm>
+            <a:prstGeom prst="line">
+              <a:avLst/>
+            </a:prstGeom>
+          </p:spPr>
+          <p:style>
+            <a:lnRef idx="1">
+              <a:schemeClr val="accent1"/>
+            </a:lnRef>
+            <a:fillRef idx="0">
+              <a:schemeClr val="accent1"/>
+            </a:fillRef>
+            <a:effectRef idx="0">
+              <a:schemeClr val="accent1"/>
+            </a:effectRef>
+            <a:fontRef idx="minor">
+              <a:schemeClr val="tx1"/>
+            </a:fontRef>
+          </p:style>
+        </p:cxnSp>
+        <p:cxnSp>
+          <p:nvCxnSpPr>
+            <p:cNvPr id="69" name="Straight Arrow Connector 68"/>
+            <p:cNvCxnSpPr>
+              <a:endCxn id="67" idx="1"/>
+            </p:cNvCxnSpPr>
+            <p:nvPr/>
+          </p:nvCxnSpPr>
+          <p:spPr>
+            <a:xfrm>
+              <a:off x="4718548" y="5854077"/>
+              <a:ext cx="422371" cy="4"/>
+            </a:xfrm>
+            <a:prstGeom prst="straightConnector1">
+              <a:avLst/>
+            </a:prstGeom>
+            <a:ln>
+              <a:tailEnd type="triangle"/>
+            </a:ln>
+          </p:spPr>
+          <p:style>
+            <a:lnRef idx="1">
+              <a:schemeClr val="accent1"/>
+            </a:lnRef>
+            <a:fillRef idx="0">
+              <a:schemeClr val="accent1"/>
+            </a:fillRef>
+            <a:effectRef idx="0">
+              <a:schemeClr val="accent1"/>
+            </a:effectRef>
+            <a:fontRef idx="minor">
+              <a:schemeClr val="tx1"/>
+            </a:fontRef>
+          </p:style>
+        </p:cxnSp>
+        <p:cxnSp>
+          <p:nvCxnSpPr>
+            <p:cNvPr id="72" name="Straight Arrow Connector 71"/>
+            <p:cNvCxnSpPr>
+              <a:endCxn id="50" idx="1"/>
+            </p:cNvCxnSpPr>
+            <p:nvPr/>
+          </p:nvCxnSpPr>
+          <p:spPr>
+            <a:xfrm>
+              <a:off x="4728366" y="3957078"/>
+              <a:ext cx="412553" cy="4"/>
+            </a:xfrm>
+            <a:prstGeom prst="straightConnector1">
+              <a:avLst/>
+            </a:prstGeom>
+            <a:ln>
+              <a:tailEnd type="triangle"/>
+            </a:ln>
+          </p:spPr>
+          <p:style>
+            <a:lnRef idx="1">
+              <a:schemeClr val="accent1"/>
+            </a:lnRef>
+            <a:fillRef idx="0">
+              <a:schemeClr val="accent1"/>
+            </a:fillRef>
+            <a:effectRef idx="0">
+              <a:schemeClr val="accent1"/>
+            </a:effectRef>
+            <a:fontRef idx="minor">
+              <a:schemeClr val="tx1"/>
+            </a:fontRef>
+          </p:style>
+        </p:cxnSp>
+        <p:cxnSp>
+          <p:nvCxnSpPr>
+            <p:cNvPr id="78" name="Straight Arrow Connector 77"/>
+            <p:cNvCxnSpPr>
+              <a:stCxn id="25" idx="3"/>
+              <a:endCxn id="92" idx="1"/>
+            </p:cNvCxnSpPr>
+            <p:nvPr/>
+          </p:nvCxnSpPr>
+          <p:spPr>
+            <a:xfrm flipV="1">
+              <a:off x="7681603" y="2159213"/>
+              <a:ext cx="959719" cy="6213"/>
+            </a:xfrm>
+            <a:prstGeom prst="straightConnector1">
+              <a:avLst/>
+            </a:prstGeom>
+            <a:ln>
+              <a:solidFill>
+                <a:schemeClr val="tx1"/>
+              </a:solidFill>
+              <a:prstDash val="dash"/>
+              <a:tailEnd type="triangle"/>
+            </a:ln>
+          </p:spPr>
+          <p:style>
+            <a:lnRef idx="1">
+              <a:schemeClr val="accent1"/>
+            </a:lnRef>
+            <a:fillRef idx="0">
+              <a:schemeClr val="accent1"/>
+            </a:fillRef>
+            <a:effectRef idx="0">
+              <a:schemeClr val="accent1"/>
+            </a:effectRef>
+            <a:fontRef idx="minor">
+              <a:schemeClr val="tx1"/>
+            </a:fontRef>
+          </p:style>
+        </p:cxnSp>
+        <p:cxnSp>
+          <p:nvCxnSpPr>
+            <p:cNvPr id="81" name="Straight Arrow Connector 80"/>
+            <p:cNvCxnSpPr>
+              <a:stCxn id="50" idx="3"/>
+              <a:endCxn id="94" idx="1"/>
+            </p:cNvCxnSpPr>
+            <p:nvPr/>
+          </p:nvCxnSpPr>
+          <p:spPr>
+            <a:xfrm>
+              <a:off x="7681603" y="3957082"/>
+              <a:ext cx="895711" cy="8397"/>
+            </a:xfrm>
+            <a:prstGeom prst="straightConnector1">
+              <a:avLst/>
+            </a:prstGeom>
+            <a:ln>
+              <a:solidFill>
+                <a:schemeClr val="tx1"/>
+              </a:solidFill>
+              <a:prstDash val="dash"/>
+              <a:tailEnd type="triangle"/>
+            </a:ln>
+          </p:spPr>
+          <p:style>
+            <a:lnRef idx="1">
+              <a:schemeClr val="accent1"/>
+            </a:lnRef>
+            <a:fillRef idx="0">
+              <a:schemeClr val="accent1"/>
+            </a:fillRef>
+            <a:effectRef idx="0">
+              <a:schemeClr val="accent1"/>
+            </a:effectRef>
+            <a:fontRef idx="minor">
+              <a:schemeClr val="tx1"/>
+            </a:fontRef>
+          </p:style>
+        </p:cxnSp>
+        <p:cxnSp>
+          <p:nvCxnSpPr>
+            <p:cNvPr id="84" name="Straight Arrow Connector 83"/>
+            <p:cNvCxnSpPr>
+              <a:stCxn id="67" idx="3"/>
+              <a:endCxn id="95" idx="1"/>
+            </p:cNvCxnSpPr>
+            <p:nvPr/>
+          </p:nvCxnSpPr>
+          <p:spPr>
+            <a:xfrm flipV="1">
+              <a:off x="7681603" y="5854078"/>
+              <a:ext cx="895711" cy="3"/>
+            </a:xfrm>
+            <a:prstGeom prst="straightConnector1">
+              <a:avLst/>
+            </a:prstGeom>
+            <a:ln>
+              <a:solidFill>
+                <a:schemeClr val="tx1"/>
+              </a:solidFill>
+              <a:prstDash val="dash"/>
+              <a:tailEnd type="triangle"/>
+            </a:ln>
+          </p:spPr>
+          <p:style>
+            <a:lnRef idx="1">
+              <a:schemeClr val="accent1"/>
+            </a:lnRef>
+            <a:fillRef idx="0">
+              <a:schemeClr val="accent1"/>
+            </a:fillRef>
+            <a:effectRef idx="0">
+              <a:schemeClr val="accent1"/>
+            </a:effectRef>
+            <a:fontRef idx="minor">
+              <a:schemeClr val="tx1"/>
+            </a:fontRef>
+          </p:style>
+        </p:cxnSp>
+        <p:cxnSp>
+          <p:nvCxnSpPr>
+            <p:cNvPr id="87" name="Straight Arrow Connector 86"/>
+            <p:cNvCxnSpPr>
+              <a:stCxn id="127" idx="3"/>
+              <a:endCxn id="7" idx="1"/>
+            </p:cNvCxnSpPr>
+            <p:nvPr/>
+          </p:nvCxnSpPr>
+          <p:spPr>
+            <a:xfrm>
+              <a:off x="1705537" y="3957078"/>
+              <a:ext cx="551738" cy="0"/>
+            </a:xfrm>
+            <a:prstGeom prst="straightConnector1">
+              <a:avLst/>
+            </a:prstGeom>
+            <a:ln>
+              <a:solidFill>
+                <a:schemeClr val="tx1"/>
+              </a:solidFill>
+              <a:prstDash val="dash"/>
+              <a:tailEnd type="triangle"/>
+            </a:ln>
+          </p:spPr>
+          <p:style>
+            <a:lnRef idx="1">
+              <a:schemeClr val="accent1"/>
+            </a:lnRef>
+            <a:fillRef idx="0">
+              <a:schemeClr val="accent1"/>
+            </a:fillRef>
+            <a:effectRef idx="0">
+              <a:schemeClr val="accent1"/>
+            </a:effectRef>
+            <a:fontRef idx="minor">
+              <a:schemeClr val="tx1"/>
+            </a:fontRef>
+          </p:style>
+        </p:cxnSp>
+        <p:sp>
+          <p:nvSpPr>
+            <p:cNvPr id="92" name="Rounded Rectangle 91"/>
+            <p:cNvSpPr/>
+            <p:nvPr/>
+          </p:nvSpPr>
+          <p:spPr>
+            <a:xfrm>
+              <a:off x="8641322" y="1765273"/>
+              <a:ext cx="1975104" cy="787879"/>
+            </a:xfrm>
+            <a:prstGeom prst="roundRect">
+              <a:avLst/>
+            </a:prstGeom>
+            <a:noFill/>
+            <a:ln>
+              <a:solidFill>
+                <a:schemeClr val="tx1"/>
+              </a:solidFill>
+            </a:ln>
+          </p:spPr>
+          <p:style>
+            <a:lnRef idx="2">
+              <a:schemeClr val="accent1">
+                <a:shade val="50000"/>
+              </a:schemeClr>
+            </a:lnRef>
+            <a:fillRef idx="1">
+              <a:schemeClr val="accent1"/>
+            </a:fillRef>
+            <a:effectRef idx="0">
+              <a:schemeClr val="accent1"/>
+            </a:effectRef>
+            <a:fontRef idx="minor">
+              <a:schemeClr val="lt1"/>
+            </a:fontRef>
+          </p:style>
+          <p:txBody>
+            <a:bodyPr rtlCol="0" anchor="ctr"/>
+            <a:lstStyle/>
+            <a:p>
+              <a:pPr algn="ctr"/>
+              <a:r>
+                <a:rPr lang="en-US" sz="1600" dirty="0" smtClean="0">
+                  <a:solidFill>
+                    <a:schemeClr val="tx1"/>
+                  </a:solidFill>
+                </a:rPr>
+                <a:t>Bounding Box prediction of texts</a:t>
+              </a:r>
+              <a:endParaRPr lang="en-US" sz="1600" dirty="0">
+                <a:solidFill>
+                  <a:schemeClr val="tx1"/>
+                </a:solidFill>
+              </a:endParaRPr>
+            </a:p>
+          </p:txBody>
+        </p:sp>
+        <p:sp>
+          <p:nvSpPr>
+            <p:cNvPr id="94" name="Rounded Rectangle 93"/>
+            <p:cNvSpPr/>
+            <p:nvPr/>
+          </p:nvSpPr>
+          <p:spPr>
+            <a:xfrm>
+              <a:off x="8577314" y="3571539"/>
+              <a:ext cx="1975104" cy="787879"/>
+            </a:xfrm>
+            <a:prstGeom prst="roundRect">
+              <a:avLst/>
+            </a:prstGeom>
+            <a:noFill/>
+            <a:ln>
+              <a:solidFill>
+                <a:schemeClr val="tx1"/>
+              </a:solidFill>
+            </a:ln>
+          </p:spPr>
+          <p:style>
+            <a:lnRef idx="2">
+              <a:schemeClr val="accent1">
+                <a:shade val="50000"/>
+              </a:schemeClr>
+            </a:lnRef>
+            <a:fillRef idx="1">
+              <a:schemeClr val="accent1"/>
+            </a:fillRef>
+            <a:effectRef idx="0">
+              <a:schemeClr val="accent1"/>
+            </a:effectRef>
+            <a:fontRef idx="minor">
+              <a:schemeClr val="lt1"/>
+            </a:fontRef>
+          </p:style>
+          <p:txBody>
+            <a:bodyPr rtlCol="0" anchor="ctr"/>
+            <a:lstStyle/>
+            <a:p>
+              <a:pPr algn="ctr"/>
+              <a:r>
+                <a:rPr lang="en-US" sz="1600" dirty="0" smtClean="0">
+                  <a:solidFill>
+                    <a:schemeClr val="tx1"/>
+                  </a:solidFill>
+                </a:rPr>
+                <a:t>Class predictions of Texts/Non-Texts</a:t>
+              </a:r>
+              <a:endParaRPr lang="en-US" sz="1600" dirty="0">
+                <a:solidFill>
+                  <a:schemeClr val="tx1"/>
+                </a:solidFill>
+              </a:endParaRPr>
+            </a:p>
+          </p:txBody>
+        </p:sp>
+        <p:sp>
+          <p:nvSpPr>
+            <p:cNvPr id="95" name="Rounded Rectangle 94"/>
+            <p:cNvSpPr/>
+            <p:nvPr/>
+          </p:nvSpPr>
+          <p:spPr>
+            <a:xfrm>
+              <a:off x="8577314" y="5460138"/>
+              <a:ext cx="1975104" cy="787879"/>
+            </a:xfrm>
+            <a:prstGeom prst="roundRect">
+              <a:avLst/>
+            </a:prstGeom>
+            <a:noFill/>
+            <a:ln>
+              <a:solidFill>
+                <a:schemeClr val="tx1"/>
+              </a:solidFill>
+            </a:ln>
+          </p:spPr>
+          <p:style>
+            <a:lnRef idx="2">
+              <a:schemeClr val="accent1">
+                <a:shade val="50000"/>
+              </a:schemeClr>
+            </a:lnRef>
+            <a:fillRef idx="1">
+              <a:schemeClr val="accent1"/>
+            </a:fillRef>
+            <a:effectRef idx="0">
+              <a:schemeClr val="accent1"/>
+            </a:effectRef>
+            <a:fontRef idx="minor">
+              <a:schemeClr val="lt1"/>
+            </a:fontRef>
+          </p:style>
+          <p:txBody>
+            <a:bodyPr rtlCol="0" anchor="ctr"/>
+            <a:lstStyle/>
+            <a:p>
+              <a:pPr algn="ctr"/>
+              <a:r>
+                <a:rPr lang="en-US" sz="1600" dirty="0" smtClean="0">
+                  <a:solidFill>
+                    <a:schemeClr val="tx1"/>
+                  </a:solidFill>
+                </a:rPr>
+                <a:t>Prediction of words from detected texts</a:t>
+              </a:r>
+              <a:endParaRPr lang="en-US" sz="1600" dirty="0">
+                <a:solidFill>
+                  <a:schemeClr val="tx1"/>
+                </a:solidFill>
+              </a:endParaRPr>
+            </a:p>
+          </p:txBody>
+        </p:sp>
+        <p:grpSp>
+          <p:nvGrpSpPr>
+            <p:cNvPr id="115" name="Group 114"/>
+            <p:cNvGrpSpPr/>
+            <p:nvPr/>
+          </p:nvGrpSpPr>
+          <p:grpSpPr>
+            <a:xfrm>
+              <a:off x="1650255" y="1020491"/>
+              <a:ext cx="8422009" cy="338554"/>
+              <a:chOff x="1671472" y="473637"/>
+              <a:chExt cx="8422009" cy="338554"/>
+            </a:xfrm>
+          </p:grpSpPr>
+          <p:sp>
+            <p:nvSpPr>
+              <p:cNvPr id="112" name="TextBox 111"/>
+              <p:cNvSpPr txBox="1"/>
+              <p:nvPr/>
+            </p:nvSpPr>
+            <p:spPr>
+              <a:xfrm>
+                <a:off x="1671472" y="473637"/>
+                <a:ext cx="716863" cy="338554"/>
+              </a:xfrm>
+              <a:prstGeom prst="rect">
+                <a:avLst/>
+              </a:prstGeom>
+              <a:noFill/>
+            </p:spPr>
+            <p:txBody>
+              <a:bodyPr wrap="none" rtlCol="0">
+                <a:spAutoFit/>
+              </a:bodyPr>
+              <a:lstStyle/>
+              <a:p>
+                <a:r>
+                  <a:rPr lang="en-US" sz="1600" b="1" i="1" dirty="0" smtClean="0"/>
+                  <a:t>Inputs</a:t>
+                </a:r>
+                <a:endParaRPr lang="en-US" sz="1600" b="1" i="1" dirty="0"/>
+              </a:p>
+            </p:txBody>
+          </p:sp>
+          <p:sp>
+            <p:nvSpPr>
+              <p:cNvPr id="113" name="TextBox 112"/>
+              <p:cNvSpPr txBox="1"/>
+              <p:nvPr/>
+            </p:nvSpPr>
+            <p:spPr>
+              <a:xfrm>
+                <a:off x="5450742" y="473637"/>
+                <a:ext cx="1967783" cy="338554"/>
+              </a:xfrm>
+              <a:prstGeom prst="rect">
+                <a:avLst/>
+              </a:prstGeom>
+              <a:noFill/>
+            </p:spPr>
+            <p:txBody>
+              <a:bodyPr wrap="none" rtlCol="0">
+                <a:spAutoFit/>
+              </a:bodyPr>
+              <a:lstStyle/>
+              <a:p>
+                <a:r>
+                  <a:rPr lang="en-US" sz="1600" b="1" i="1" dirty="0" smtClean="0"/>
+                  <a:t>Proposed Techniques</a:t>
+                </a:r>
+                <a:endParaRPr lang="en-US" sz="1600" b="1" i="1" dirty="0"/>
+              </a:p>
+            </p:txBody>
+          </p:sp>
+          <p:sp>
+            <p:nvSpPr>
+              <p:cNvPr id="114" name="TextBox 113"/>
+              <p:cNvSpPr txBox="1"/>
+              <p:nvPr/>
+            </p:nvSpPr>
+            <p:spPr>
+              <a:xfrm>
+                <a:off x="9222730" y="473637"/>
+                <a:ext cx="870751" cy="338554"/>
+              </a:xfrm>
+              <a:prstGeom prst="rect">
+                <a:avLst/>
+              </a:prstGeom>
+              <a:noFill/>
+            </p:spPr>
+            <p:txBody>
+              <a:bodyPr wrap="none" rtlCol="0">
+                <a:spAutoFit/>
+              </a:bodyPr>
+              <a:lstStyle/>
+              <a:p>
+                <a:r>
+                  <a:rPr lang="en-US" sz="1600" b="1" i="1" dirty="0" smtClean="0"/>
+                  <a:t>Outputs</a:t>
+                </a:r>
+                <a:endParaRPr lang="en-US" sz="1600" b="1" i="1" dirty="0"/>
+              </a:p>
+            </p:txBody>
+          </p:sp>
+        </p:grpSp>
+        <p:sp>
+          <p:nvSpPr>
+            <p:cNvPr id="127" name="Rounded Rectangle 126"/>
+            <p:cNvSpPr/>
+            <p:nvPr/>
+          </p:nvSpPr>
+          <p:spPr>
+            <a:xfrm>
+              <a:off x="252829" y="3312426"/>
+              <a:ext cx="1452708" cy="1289304"/>
+            </a:xfrm>
+            <a:prstGeom prst="roundRect">
+              <a:avLst/>
+            </a:prstGeom>
+            <a:noFill/>
+            <a:ln>
+              <a:solidFill>
+                <a:schemeClr val="tx1"/>
+              </a:solidFill>
+            </a:ln>
+          </p:spPr>
+          <p:style>
+            <a:lnRef idx="2">
+              <a:schemeClr val="accent1">
+                <a:shade val="50000"/>
+              </a:schemeClr>
+            </a:lnRef>
+            <a:fillRef idx="1">
+              <a:schemeClr val="accent1"/>
+            </a:fillRef>
+            <a:effectRef idx="0">
+              <a:schemeClr val="accent1"/>
+            </a:effectRef>
+            <a:fontRef idx="minor">
+              <a:schemeClr val="lt1"/>
+            </a:fontRef>
+          </p:style>
+          <p:txBody>
+            <a:bodyPr rtlCol="0" anchor="ctr"/>
+            <a:lstStyle/>
+            <a:p>
+              <a:pPr algn="ctr"/>
+              <a:r>
+                <a:rPr lang="en-US" sz="1600" dirty="0">
+                  <a:solidFill>
+                    <a:schemeClr val="tx1"/>
+                  </a:solidFill>
+                </a:rPr>
+                <a:t>Dataset Images</a:t>
+              </a:r>
+              <a:endParaRPr lang="en-US" sz="1600" dirty="0">
+                <a:solidFill>
+                  <a:schemeClr val="tx1"/>
+                </a:solidFill>
+              </a:endParaRPr>
+            </a:p>
+          </p:txBody>
+        </p:sp>
+      </p:grpSp>
+    </p:spTree>
+    <p:extLst>
+      <p:ext uri="{BB962C8B-B14F-4D97-AF65-F5344CB8AC3E}">
+        <p14:creationId xmlns:p14="http://schemas.microsoft.com/office/powerpoint/2010/main" val="1414567709"/>
+      </p:ext>
+    </p:extLst>
+  </p:cSld>
+  <p:clrMapOvr>
+    <a:masterClrMapping/>
+  </p:clrMapOvr>
+</p:sld>
+</file>
+
+<file path=ppt/slides/slide5.xml><?xml version="1.0" encoding="utf-8"?>
+<p:sld xmlns:a="http://schemas.openxmlformats.org/drawingml/2006/main" xmlns:r="http://schemas.openxmlformats.org/officeDocument/2006/relationships" xmlns:p="http://schemas.openxmlformats.org/presentationml/2006/main">
+  <p:cSld>
+    <p:spTree>
+      <p:nvGrpSpPr>
+        <p:cNvPr id="1" name=""/>
+        <p:cNvGrpSpPr/>
+        <p:nvPr/>
+      </p:nvGrpSpPr>
+      <p:grpSpPr>
+        <a:xfrm>
+          <a:off x="0" y="0"/>
+          <a:ext cx="0" cy="0"/>
+          <a:chOff x="0" y="0"/>
+          <a:chExt cx="0" cy="0"/>
+        </a:xfrm>
+      </p:grpSpPr>
       <p:sp>
         <p:nvSpPr>
           <p:cNvPr id="4" name="TextBox 3"/>
@@ -4559,11 +5635,7 @@
             </a:pPr>
             <a:r>
               <a:rPr lang="en-US" sz="2000" dirty="0" smtClean="0"/>
-              <a:t>Mask-RCNN with backbone (resnet101, resnet50</a:t>
-            </a:r>
-            <a:r>
-              <a:rPr lang="en-US" sz="2000" dirty="0" smtClean="0"/>
-              <a:t>)</a:t>
+              <a:t>Mask-RCNN with backbone (resnet101, resnet50)</a:t>
             </a:r>
           </a:p>
           <a:p>
@@ -4605,7 +5677,7 @@
           <p:cNvPr id="5" name="Picture 4">
             <a:extLst>
               <a:ext uri="{FF2B5EF4-FFF2-40B4-BE49-F238E27FC236}">
-                <a16:creationId xmlns="" xmlns:a16="http://schemas.microsoft.com/office/drawing/2014/main" id="{4F123114-E0DF-4542-9867-FE12447B6DCE}"/>
+                <a16:creationId xmlns:a16="http://schemas.microsoft.com/office/drawing/2014/main" xmlns="" id="{4F123114-E0DF-4542-9867-FE12447B6DCE}"/>
               </a:ext>
             </a:extLst>
           </p:cNvPr>
@@ -4649,7 +5721,7 @@
 </p:sld>
 </file>
 
-<file path=ppt/slides/slide5.xml><?xml version="1.0" encoding="utf-8"?>
+<file path=ppt/slides/slide6.xml><?xml version="1.0" encoding="utf-8"?>
 <p:sld xmlns:a="http://schemas.openxmlformats.org/drawingml/2006/main" xmlns:r="http://schemas.openxmlformats.org/officeDocument/2006/relationships" xmlns:p="http://schemas.openxmlformats.org/presentationml/2006/main">
   <p:cSld>
     <p:spTree>
@@ -5376,7 +6448,7 @@
           <p:cNvPr id="28" name="Picture 27">
             <a:extLst>
               <a:ext uri="{FF2B5EF4-FFF2-40B4-BE49-F238E27FC236}">
-                <a16:creationId xmlns="" xmlns:a16="http://schemas.microsoft.com/office/drawing/2014/main" id="{4F123114-E0DF-4542-9867-FE12447B6DCE}"/>
+                <a16:creationId xmlns:a16="http://schemas.microsoft.com/office/drawing/2014/main" xmlns="" id="{4F123114-E0DF-4542-9867-FE12447B6DCE}"/>
               </a:ext>
             </a:extLst>
           </p:cNvPr>
@@ -5453,7 +6525,7 @@
 </p:sld>
 </file>
 
-<file path=ppt/slides/slide6.xml><?xml version="1.0" encoding="utf-8"?>
+<file path=ppt/slides/slide7.xml><?xml version="1.0" encoding="utf-8"?>
 <p:sld xmlns:a="http://schemas.openxmlformats.org/drawingml/2006/main" xmlns:r="http://schemas.openxmlformats.org/officeDocument/2006/relationships" xmlns:p="http://schemas.openxmlformats.org/presentationml/2006/main">
   <p:cSld>
     <p:spTree>
@@ -5590,7 +6662,7 @@
           <p:cNvPr id="5" name="Picture 4">
             <a:extLst>
               <a:ext uri="{FF2B5EF4-FFF2-40B4-BE49-F238E27FC236}">
-                <a16:creationId xmlns="" xmlns:a16="http://schemas.microsoft.com/office/drawing/2014/main" id="{4F123114-E0DF-4542-9867-FE12447B6DCE}"/>
+                <a16:creationId xmlns:a16="http://schemas.microsoft.com/office/drawing/2014/main" xmlns="" id="{4F123114-E0DF-4542-9867-FE12447B6DCE}"/>
               </a:ext>
             </a:extLst>
           </p:cNvPr>
@@ -5634,7 +6706,7 @@
 </p:sld>
 </file>
 
-<file path=ppt/slides/slide7.xml><?xml version="1.0" encoding="utf-8"?>
+<file path=ppt/slides/slide8.xml><?xml version="1.0" encoding="utf-8"?>
 <p:sld xmlns:a="http://schemas.openxmlformats.org/drawingml/2006/main" xmlns:r="http://schemas.openxmlformats.org/officeDocument/2006/relationships" xmlns:p="http://schemas.openxmlformats.org/presentationml/2006/main">
   <p:cSld>
     <p:spTree>
@@ -5692,7 +6764,6 @@
               <a:rPr lang="en-US" sz="2000" dirty="0" smtClean="0"/>
               <a:t> </a:t>
             </a:r>
-            <a:endParaRPr lang="en-US" sz="2000" dirty="0" smtClean="0"/>
           </a:p>
           <a:p>
             <a:r>
@@ -5707,7 +6778,6 @@
               <a:rPr lang="en-US" sz="2000" dirty="0" smtClean="0"/>
               <a:t>:</a:t>
             </a:r>
-            <a:endParaRPr lang="en-US" sz="2000" dirty="0" smtClean="0"/>
           </a:p>
           <a:p>
             <a:pPr marL="342900" indent="-342900">
@@ -5768,7 +6838,6 @@
               <a:rPr lang="en-US" dirty="0" smtClean="0"/>
               <a:t>PIL(Pillow)</a:t>
             </a:r>
-            <a:endParaRPr lang="en-US" dirty="0" smtClean="0"/>
           </a:p>
         </p:txBody>
       </p:sp>
@@ -5777,7 +6846,7 @@
           <p:cNvPr id="5" name="Picture 4">
             <a:extLst>
               <a:ext uri="{FF2B5EF4-FFF2-40B4-BE49-F238E27FC236}">
-                <a16:creationId xmlns="" xmlns:a16="http://schemas.microsoft.com/office/drawing/2014/main" id="{4F123114-E0DF-4542-9867-FE12447B6DCE}"/>
+                <a16:creationId xmlns:a16="http://schemas.microsoft.com/office/drawing/2014/main" xmlns="" id="{4F123114-E0DF-4542-9867-FE12447B6DCE}"/>
               </a:ext>
             </a:extLst>
           </p:cNvPr>
@@ -6033,7 +7102,7 @@
 </p:sld>
 </file>
 
-<file path=ppt/slides/slide8.xml><?xml version="1.0" encoding="utf-8"?>
+<file path=ppt/slides/slide9.xml><?xml version="1.0" encoding="utf-8"?>
 <p:sld xmlns:a="http://schemas.openxmlformats.org/drawingml/2006/main" xmlns:r="http://schemas.openxmlformats.org/officeDocument/2006/relationships" xmlns:p="http://schemas.openxmlformats.org/presentationml/2006/main">
   <p:cSld>
     <p:spTree>
@@ -6076,7 +7145,6 @@
               <a:rPr lang="en-US" sz="2000" b="1" dirty="0" smtClean="0"/>
               <a:t>Links to Download:</a:t>
             </a:r>
-            <a:endParaRPr lang="en-US" sz="2000" b="1" dirty="0" smtClean="0"/>
           </a:p>
           <a:p>
             <a:endParaRPr lang="en-US" sz="2000" dirty="0" smtClean="0"/>
@@ -6348,7 +7416,6 @@
               <a:rPr lang="en-US" dirty="0"/>
               <a:t>-image</a:t>
             </a:r>
-            <a:endParaRPr lang="en-US" dirty="0"/>
           </a:p>
           <a:p>
             <a:pPr marL="285750" indent="-285750">
@@ -6461,7 +7528,6 @@
               <a:rPr lang="en-US" dirty="0"/>
               <a:t>-learn</a:t>
             </a:r>
-            <a:endParaRPr lang="en-US" dirty="0"/>
           </a:p>
         </p:txBody>
       </p:sp>
@@ -6612,7 +7678,6 @@
                 <a:rPr lang="en-US" dirty="0"/>
                 <a:t>structure</a:t>
               </a:r>
-              <a:endParaRPr lang="en-US" dirty="0"/>
             </a:p>
           </p:txBody>
         </p:sp>

</xml_diff>